<commit_message>
added comments about String comparison
</commit_message>
<xml_diff>
--- a/cs401_1_27_20.pptx
+++ b/cs401_1_27_20.pptx
@@ -240,7 +240,7 @@
           <a:p>
             <a:fld id="{040C7ED3-6993-4347-B443-83F433321F8D}" type="datetimeFigureOut">
               <a:rPr lang="en-US" smtClean="0"/>
-              <a:t>1/26/2020</a:t>
+              <a:t>1/27/2020</a:t>
             </a:fld>
             <a:endParaRPr lang="en-US"/>
           </a:p>
@@ -638,7 +638,7 @@
           <a:p>
             <a:fld id="{331D76CF-5E7C-420B-89A3-7189BACB8345}" type="datetimeFigureOut">
               <a:rPr lang="en-US" smtClean="0"/>
-              <a:t>1/26/2020</a:t>
+              <a:t>1/27/2020</a:t>
             </a:fld>
             <a:endParaRPr lang="en-US"/>
           </a:p>
@@ -808,7 +808,7 @@
           <a:p>
             <a:fld id="{331D76CF-5E7C-420B-89A3-7189BACB8345}" type="datetimeFigureOut">
               <a:rPr lang="en-US" smtClean="0"/>
-              <a:t>1/26/2020</a:t>
+              <a:t>1/27/2020</a:t>
             </a:fld>
             <a:endParaRPr lang="en-US"/>
           </a:p>
@@ -988,7 +988,7 @@
           <a:p>
             <a:fld id="{331D76CF-5E7C-420B-89A3-7189BACB8345}" type="datetimeFigureOut">
               <a:rPr lang="en-US" smtClean="0"/>
-              <a:t>1/26/2020</a:t>
+              <a:t>1/27/2020</a:t>
             </a:fld>
             <a:endParaRPr lang="en-US"/>
           </a:p>
@@ -1158,7 +1158,7 @@
           <a:p>
             <a:fld id="{331D76CF-5E7C-420B-89A3-7189BACB8345}" type="datetimeFigureOut">
               <a:rPr lang="en-US" smtClean="0"/>
-              <a:t>1/26/2020</a:t>
+              <a:t>1/27/2020</a:t>
             </a:fld>
             <a:endParaRPr lang="en-US"/>
           </a:p>
@@ -1402,7 +1402,7 @@
           <a:p>
             <a:fld id="{331D76CF-5E7C-420B-89A3-7189BACB8345}" type="datetimeFigureOut">
               <a:rPr lang="en-US" smtClean="0"/>
-              <a:t>1/26/2020</a:t>
+              <a:t>1/27/2020</a:t>
             </a:fld>
             <a:endParaRPr lang="en-US"/>
           </a:p>
@@ -1634,7 +1634,7 @@
           <a:p>
             <a:fld id="{331D76CF-5E7C-420B-89A3-7189BACB8345}" type="datetimeFigureOut">
               <a:rPr lang="en-US" smtClean="0"/>
-              <a:t>1/26/2020</a:t>
+              <a:t>1/27/2020</a:t>
             </a:fld>
             <a:endParaRPr lang="en-US"/>
           </a:p>
@@ -2001,7 +2001,7 @@
           <a:p>
             <a:fld id="{331D76CF-5E7C-420B-89A3-7189BACB8345}" type="datetimeFigureOut">
               <a:rPr lang="en-US" smtClean="0"/>
-              <a:t>1/26/2020</a:t>
+              <a:t>1/27/2020</a:t>
             </a:fld>
             <a:endParaRPr lang="en-US"/>
           </a:p>
@@ -2119,7 +2119,7 @@
           <a:p>
             <a:fld id="{331D76CF-5E7C-420B-89A3-7189BACB8345}" type="datetimeFigureOut">
               <a:rPr lang="en-US" smtClean="0"/>
-              <a:t>1/26/2020</a:t>
+              <a:t>1/27/2020</a:t>
             </a:fld>
             <a:endParaRPr lang="en-US"/>
           </a:p>
@@ -2214,7 +2214,7 @@
           <a:p>
             <a:fld id="{331D76CF-5E7C-420B-89A3-7189BACB8345}" type="datetimeFigureOut">
               <a:rPr lang="en-US" smtClean="0"/>
-              <a:t>1/26/2020</a:t>
+              <a:t>1/27/2020</a:t>
             </a:fld>
             <a:endParaRPr lang="en-US"/>
           </a:p>
@@ -2491,7 +2491,7 @@
           <a:p>
             <a:fld id="{331D76CF-5E7C-420B-89A3-7189BACB8345}" type="datetimeFigureOut">
               <a:rPr lang="en-US" smtClean="0"/>
-              <a:t>1/26/2020</a:t>
+              <a:t>1/27/2020</a:t>
             </a:fld>
             <a:endParaRPr lang="en-US"/>
           </a:p>
@@ -2748,7 +2748,7 @@
           <a:p>
             <a:fld id="{331D76CF-5E7C-420B-89A3-7189BACB8345}" type="datetimeFigureOut">
               <a:rPr lang="en-US" smtClean="0"/>
-              <a:t>1/26/2020</a:t>
+              <a:t>1/27/2020</a:t>
             </a:fld>
             <a:endParaRPr lang="en-US"/>
           </a:p>
@@ -2961,7 +2961,7 @@
           <a:p>
             <a:fld id="{331D76CF-5E7C-420B-89A3-7189BACB8345}" type="datetimeFigureOut">
               <a:rPr lang="en-US" smtClean="0"/>
-              <a:t>1/26/2020</a:t>
+              <a:t>1/27/2020</a:t>
             </a:fld>
             <a:endParaRPr lang="en-US"/>
           </a:p>
@@ -3371,7 +3371,7 @@
           <p:cNvPr id="4" name="TextBox 3">
             <a:extLst>
               <a:ext uri="{FF2B5EF4-FFF2-40B4-BE49-F238E27FC236}">
-                <a16:creationId xmlns:a16="http://schemas.microsoft.com/office/drawing/2014/main" id="{8A67A37A-C488-40D7-A088-6774405888BB}"/>
+                <a16:creationId xmlns:a16="http://schemas.microsoft.com/office/drawing/2014/main" xmlns="" id="{8A67A37A-C488-40D7-A088-6774405888BB}"/>
               </a:ext>
             </a:extLst>
           </p:cNvPr>
@@ -3409,7 +3409,7 @@
           <p:cNvPr id="5" name="TextBox 4">
             <a:extLst>
               <a:ext uri="{FF2B5EF4-FFF2-40B4-BE49-F238E27FC236}">
-                <a16:creationId xmlns:a16="http://schemas.microsoft.com/office/drawing/2014/main" id="{EC931DCA-4690-4B93-9419-BA902293A61A}"/>
+                <a16:creationId xmlns:a16="http://schemas.microsoft.com/office/drawing/2014/main" xmlns="" id="{EC931DCA-4690-4B93-9419-BA902293A61A}"/>
               </a:ext>
             </a:extLst>
           </p:cNvPr>
@@ -3568,6 +3568,13 @@
   <p:clrMapOvr>
     <a:masterClrMapping/>
   </p:clrMapOvr>
+  <p:timing>
+    <p:tnLst>
+      <p:par>
+        <p:cTn id="1" dur="indefinite" restart="never" nodeType="tmRoot"/>
+      </p:par>
+    </p:tnLst>
+  </p:timing>
 </p:sld>
 </file>
 
@@ -3593,7 +3600,7 @@
           <p:cNvPr id="7" name="TextBox 6">
             <a:extLst>
               <a:ext uri="{FF2B5EF4-FFF2-40B4-BE49-F238E27FC236}">
-                <a16:creationId xmlns:a16="http://schemas.microsoft.com/office/drawing/2014/main" id="{882EAC00-0723-4478-82AE-41368060B6D4}"/>
+                <a16:creationId xmlns:a16="http://schemas.microsoft.com/office/drawing/2014/main" xmlns="" id="{882EAC00-0723-4478-82AE-41368060B6D4}"/>
               </a:ext>
             </a:extLst>
           </p:cNvPr>
@@ -3631,7 +3638,7 @@
           <p:cNvPr id="5" name="Picture 4" descr="The_Tile_Game.pdf - Adobe Acrobat Reader DC">
             <a:extLst>
               <a:ext uri="{FF2B5EF4-FFF2-40B4-BE49-F238E27FC236}">
-                <a16:creationId xmlns:a16="http://schemas.microsoft.com/office/drawing/2014/main" id="{F0889651-F4DB-45CB-9F1C-D24E36A26104}"/>
+                <a16:creationId xmlns:a16="http://schemas.microsoft.com/office/drawing/2014/main" xmlns="" id="{F0889651-F4DB-45CB-9F1C-D24E36A26104}"/>
               </a:ext>
             </a:extLst>
           </p:cNvPr>
@@ -3676,6 +3683,13 @@
   <p:clrMapOvr>
     <a:masterClrMapping/>
   </p:clrMapOvr>
+  <p:timing>
+    <p:tnLst>
+      <p:par>
+        <p:cTn id="1" dur="indefinite" restart="never" nodeType="tmRoot"/>
+      </p:par>
+    </p:tnLst>
+  </p:timing>
 </p:sld>
 </file>
 
@@ -3701,7 +3715,7 @@
           <p:cNvPr id="7" name="TextBox 6">
             <a:extLst>
               <a:ext uri="{FF2B5EF4-FFF2-40B4-BE49-F238E27FC236}">
-                <a16:creationId xmlns:a16="http://schemas.microsoft.com/office/drawing/2014/main" id="{882EAC00-0723-4478-82AE-41368060B6D4}"/>
+                <a16:creationId xmlns:a16="http://schemas.microsoft.com/office/drawing/2014/main" xmlns="" id="{882EAC00-0723-4478-82AE-41368060B6D4}"/>
               </a:ext>
             </a:extLst>
           </p:cNvPr>
@@ -3739,7 +3753,7 @@
           <p:cNvPr id="3" name="Picture 2" descr="The_Tile_Game.pdf - Adobe Acrobat Reader DC">
             <a:extLst>
               <a:ext uri="{FF2B5EF4-FFF2-40B4-BE49-F238E27FC236}">
-                <a16:creationId xmlns:a16="http://schemas.microsoft.com/office/drawing/2014/main" id="{4AD9A04C-4A97-4DDC-AEBA-05B40DE7BF58}"/>
+                <a16:creationId xmlns:a16="http://schemas.microsoft.com/office/drawing/2014/main" xmlns="" id="{4AD9A04C-4A97-4DDC-AEBA-05B40DE7BF58}"/>
               </a:ext>
             </a:extLst>
           </p:cNvPr>
@@ -3779,7 +3793,7 @@
           <p:cNvPr id="5" name="TextBox 4">
             <a:extLst>
               <a:ext uri="{FF2B5EF4-FFF2-40B4-BE49-F238E27FC236}">
-                <a16:creationId xmlns:a16="http://schemas.microsoft.com/office/drawing/2014/main" id="{2C212B8D-B3FE-4D6D-9564-0B6B9ABCF88C}"/>
+                <a16:creationId xmlns:a16="http://schemas.microsoft.com/office/drawing/2014/main" xmlns="" id="{2C212B8D-B3FE-4D6D-9564-0B6B9ABCF88C}"/>
               </a:ext>
             </a:extLst>
           </p:cNvPr>
@@ -3819,6 +3833,13 @@
   <p:clrMapOvr>
     <a:masterClrMapping/>
   </p:clrMapOvr>
+  <p:timing>
+    <p:tnLst>
+      <p:par>
+        <p:cTn id="1" dur="indefinite" restart="never" nodeType="tmRoot"/>
+      </p:par>
+    </p:tnLst>
+  </p:timing>
 </p:sld>
 </file>
 
@@ -3844,7 +3865,7 @@
           <p:cNvPr id="7" name="TextBox 6">
             <a:extLst>
               <a:ext uri="{FF2B5EF4-FFF2-40B4-BE49-F238E27FC236}">
-                <a16:creationId xmlns:a16="http://schemas.microsoft.com/office/drawing/2014/main" id="{882EAC00-0723-4478-82AE-41368060B6D4}"/>
+                <a16:creationId xmlns:a16="http://schemas.microsoft.com/office/drawing/2014/main" xmlns="" id="{882EAC00-0723-4478-82AE-41368060B6D4}"/>
               </a:ext>
             </a:extLst>
           </p:cNvPr>
@@ -3882,7 +3903,7 @@
           <p:cNvPr id="5" name="TextBox 4">
             <a:extLst>
               <a:ext uri="{FF2B5EF4-FFF2-40B4-BE49-F238E27FC236}">
-                <a16:creationId xmlns:a16="http://schemas.microsoft.com/office/drawing/2014/main" id="{2C212B8D-B3FE-4D6D-9564-0B6B9ABCF88C}"/>
+                <a16:creationId xmlns:a16="http://schemas.microsoft.com/office/drawing/2014/main" xmlns="" id="{2C212B8D-B3FE-4D6D-9564-0B6B9ABCF88C}"/>
               </a:ext>
             </a:extLst>
           </p:cNvPr>
@@ -3935,15 +3956,15 @@
               <a:buAutoNum type="arabicPeriod"/>
             </a:pPr>
             <a:r>
-              <a:rPr lang="en-US" dirty="0"/>
+              <a:rPr lang="en-US" strike="sngStrike" dirty="0"/>
               <a:t>You’ll fill in the actual values (shown above) in the </a:t>
             </a:r>
             <a:r>
-              <a:rPr lang="en-US" dirty="0" err="1"/>
+              <a:rPr lang="en-US" strike="sngStrike" dirty="0" err="1"/>
               <a:t>initializeGame</a:t>
             </a:r>
             <a:r>
-              <a:rPr lang="en-US" dirty="0"/>
+              <a:rPr lang="en-US" strike="sngStrike" dirty="0"/>
               <a:t> method (to be described on a later slide).</a:t>
             </a:r>
           </a:p>
@@ -3954,7 +3975,7 @@
           <p:cNvPr id="8" name="Picture 7" descr="The_Tile_Game.pdf - Adobe Acrobat Reader DC">
             <a:extLst>
               <a:ext uri="{FF2B5EF4-FFF2-40B4-BE49-F238E27FC236}">
-                <a16:creationId xmlns:a16="http://schemas.microsoft.com/office/drawing/2014/main" id="{207EB044-CA9A-4D3C-9B01-4686469F46FD}"/>
+                <a16:creationId xmlns:a16="http://schemas.microsoft.com/office/drawing/2014/main" xmlns="" id="{207EB044-CA9A-4D3C-9B01-4686469F46FD}"/>
               </a:ext>
             </a:extLst>
           </p:cNvPr>
@@ -3999,6 +4020,13 @@
   <p:clrMapOvr>
     <a:masterClrMapping/>
   </p:clrMapOvr>
+  <p:timing>
+    <p:tnLst>
+      <p:par>
+        <p:cTn id="1" dur="indefinite" restart="never" nodeType="tmRoot"/>
+      </p:par>
+    </p:tnLst>
+  </p:timing>
 </p:sld>
 </file>
 
@@ -4024,7 +4052,7 @@
           <p:cNvPr id="7" name="TextBox 6">
             <a:extLst>
               <a:ext uri="{FF2B5EF4-FFF2-40B4-BE49-F238E27FC236}">
-                <a16:creationId xmlns:a16="http://schemas.microsoft.com/office/drawing/2014/main" id="{882EAC00-0723-4478-82AE-41368060B6D4}"/>
+                <a16:creationId xmlns:a16="http://schemas.microsoft.com/office/drawing/2014/main" xmlns="" id="{882EAC00-0723-4478-82AE-41368060B6D4}"/>
               </a:ext>
             </a:extLst>
           </p:cNvPr>
@@ -4062,7 +4090,7 @@
           <p:cNvPr id="5" name="TextBox 4">
             <a:extLst>
               <a:ext uri="{FF2B5EF4-FFF2-40B4-BE49-F238E27FC236}">
-                <a16:creationId xmlns:a16="http://schemas.microsoft.com/office/drawing/2014/main" id="{2C212B8D-B3FE-4D6D-9564-0B6B9ABCF88C}"/>
+                <a16:creationId xmlns:a16="http://schemas.microsoft.com/office/drawing/2014/main" xmlns="" id="{2C212B8D-B3FE-4D6D-9564-0B6B9ABCF88C}"/>
               </a:ext>
             </a:extLst>
           </p:cNvPr>
@@ -4135,7 +4163,7 @@
           <p:cNvPr id="3" name="Picture 2" descr="The_Tile_Game.pdf - Adobe Acrobat Reader DC">
             <a:extLst>
               <a:ext uri="{FF2B5EF4-FFF2-40B4-BE49-F238E27FC236}">
-                <a16:creationId xmlns:a16="http://schemas.microsoft.com/office/drawing/2014/main" id="{BB3DC201-7163-4F9A-A9FD-29123E083DD6}"/>
+                <a16:creationId xmlns:a16="http://schemas.microsoft.com/office/drawing/2014/main" xmlns="" id="{BB3DC201-7163-4F9A-A9FD-29123E083DD6}"/>
               </a:ext>
             </a:extLst>
           </p:cNvPr>
@@ -4180,6 +4208,13 @@
   <p:clrMapOvr>
     <a:masterClrMapping/>
   </p:clrMapOvr>
+  <p:timing>
+    <p:tnLst>
+      <p:par>
+        <p:cTn id="1" dur="indefinite" restart="never" nodeType="tmRoot"/>
+      </p:par>
+    </p:tnLst>
+  </p:timing>
 </p:sld>
 </file>
 
@@ -4205,7 +4240,7 @@
           <p:cNvPr id="7" name="TextBox 6">
             <a:extLst>
               <a:ext uri="{FF2B5EF4-FFF2-40B4-BE49-F238E27FC236}">
-                <a16:creationId xmlns:a16="http://schemas.microsoft.com/office/drawing/2014/main" id="{882EAC00-0723-4478-82AE-41368060B6D4}"/>
+                <a16:creationId xmlns:a16="http://schemas.microsoft.com/office/drawing/2014/main" xmlns="" id="{882EAC00-0723-4478-82AE-41368060B6D4}"/>
               </a:ext>
             </a:extLst>
           </p:cNvPr>
@@ -4259,7 +4294,7 @@
           <p:cNvPr id="5" name="TextBox 4">
             <a:extLst>
               <a:ext uri="{FF2B5EF4-FFF2-40B4-BE49-F238E27FC236}">
-                <a16:creationId xmlns:a16="http://schemas.microsoft.com/office/drawing/2014/main" id="{2C212B8D-B3FE-4D6D-9564-0B6B9ABCF88C}"/>
+                <a16:creationId xmlns:a16="http://schemas.microsoft.com/office/drawing/2014/main" xmlns="" id="{2C212B8D-B3FE-4D6D-9564-0B6B9ABCF88C}"/>
               </a:ext>
             </a:extLst>
           </p:cNvPr>
@@ -4325,7 +4360,7 @@
           <p:cNvPr id="10" name="Picture 9" descr="The_Tile_Game.pdf - Adobe Acrobat Reader DC">
             <a:extLst>
               <a:ext uri="{FF2B5EF4-FFF2-40B4-BE49-F238E27FC236}">
-                <a16:creationId xmlns:a16="http://schemas.microsoft.com/office/drawing/2014/main" id="{8390E7A5-DE75-4DEB-923E-CFEF6C4B1506}"/>
+                <a16:creationId xmlns:a16="http://schemas.microsoft.com/office/drawing/2014/main" xmlns="" id="{8390E7A5-DE75-4DEB-923E-CFEF6C4B1506}"/>
               </a:ext>
             </a:extLst>
           </p:cNvPr>
@@ -4370,6 +4405,13 @@
   <p:clrMapOvr>
     <a:masterClrMapping/>
   </p:clrMapOvr>
+  <p:timing>
+    <p:tnLst>
+      <p:par>
+        <p:cTn id="1" dur="indefinite" restart="never" nodeType="tmRoot"/>
+      </p:par>
+    </p:tnLst>
+  </p:timing>
 </p:sld>
 </file>
 
@@ -4395,7 +4437,7 @@
           <p:cNvPr id="7" name="TextBox 6">
             <a:extLst>
               <a:ext uri="{FF2B5EF4-FFF2-40B4-BE49-F238E27FC236}">
-                <a16:creationId xmlns:a16="http://schemas.microsoft.com/office/drawing/2014/main" id="{882EAC00-0723-4478-82AE-41368060B6D4}"/>
+                <a16:creationId xmlns:a16="http://schemas.microsoft.com/office/drawing/2014/main" xmlns="" id="{882EAC00-0723-4478-82AE-41368060B6D4}"/>
               </a:ext>
             </a:extLst>
           </p:cNvPr>
@@ -4449,7 +4491,7 @@
           <p:cNvPr id="5" name="TextBox 4">
             <a:extLst>
               <a:ext uri="{FF2B5EF4-FFF2-40B4-BE49-F238E27FC236}">
-                <a16:creationId xmlns:a16="http://schemas.microsoft.com/office/drawing/2014/main" id="{2C212B8D-B3FE-4D6D-9564-0B6B9ABCF88C}"/>
+                <a16:creationId xmlns:a16="http://schemas.microsoft.com/office/drawing/2014/main" xmlns="" id="{2C212B8D-B3FE-4D6D-9564-0B6B9ABCF88C}"/>
               </a:ext>
             </a:extLst>
           </p:cNvPr>
@@ -4498,7 +4540,7 @@
           <p:cNvPr id="3" name="Picture 2" descr="The_Tile_Game.pdf - Adobe Acrobat Reader DC">
             <a:extLst>
               <a:ext uri="{FF2B5EF4-FFF2-40B4-BE49-F238E27FC236}">
-                <a16:creationId xmlns:a16="http://schemas.microsoft.com/office/drawing/2014/main" id="{2A177AEE-B2CB-4945-8F21-30B224347DDE}"/>
+                <a16:creationId xmlns:a16="http://schemas.microsoft.com/office/drawing/2014/main" xmlns="" id="{2A177AEE-B2CB-4945-8F21-30B224347DDE}"/>
               </a:ext>
             </a:extLst>
           </p:cNvPr>
@@ -4543,6 +4585,13 @@
   <p:clrMapOvr>
     <a:masterClrMapping/>
   </p:clrMapOvr>
+  <p:timing>
+    <p:tnLst>
+      <p:par>
+        <p:cTn id="1" dur="indefinite" restart="never" nodeType="tmRoot"/>
+      </p:par>
+    </p:tnLst>
+  </p:timing>
 </p:sld>
 </file>
 
@@ -4568,7 +4617,7 @@
           <p:cNvPr id="7" name="TextBox 6">
             <a:extLst>
               <a:ext uri="{FF2B5EF4-FFF2-40B4-BE49-F238E27FC236}">
-                <a16:creationId xmlns:a16="http://schemas.microsoft.com/office/drawing/2014/main" id="{882EAC00-0723-4478-82AE-41368060B6D4}"/>
+                <a16:creationId xmlns:a16="http://schemas.microsoft.com/office/drawing/2014/main" xmlns="" id="{882EAC00-0723-4478-82AE-41368060B6D4}"/>
               </a:ext>
             </a:extLst>
           </p:cNvPr>
@@ -4622,7 +4671,7 @@
           <p:cNvPr id="5" name="TextBox 4">
             <a:extLst>
               <a:ext uri="{FF2B5EF4-FFF2-40B4-BE49-F238E27FC236}">
-                <a16:creationId xmlns:a16="http://schemas.microsoft.com/office/drawing/2014/main" id="{2C212B8D-B3FE-4D6D-9564-0B6B9ABCF88C}"/>
+                <a16:creationId xmlns:a16="http://schemas.microsoft.com/office/drawing/2014/main" xmlns="" id="{2C212B8D-B3FE-4D6D-9564-0B6B9ABCF88C}"/>
               </a:ext>
             </a:extLst>
           </p:cNvPr>
@@ -4671,7 +4720,7 @@
           <p:cNvPr id="4" name="Picture 3" descr="The_Tile_Game.pdf - Adobe Acrobat Reader DC">
             <a:extLst>
               <a:ext uri="{FF2B5EF4-FFF2-40B4-BE49-F238E27FC236}">
-                <a16:creationId xmlns:a16="http://schemas.microsoft.com/office/drawing/2014/main" id="{CDFB2A34-60CF-4A16-88B1-EF5317DC6F8C}"/>
+                <a16:creationId xmlns:a16="http://schemas.microsoft.com/office/drawing/2014/main" xmlns="" id="{CDFB2A34-60CF-4A16-88B1-EF5317DC6F8C}"/>
               </a:ext>
             </a:extLst>
           </p:cNvPr>
@@ -4716,6 +4765,13 @@
   <p:clrMapOvr>
     <a:masterClrMapping/>
   </p:clrMapOvr>
+  <p:timing>
+    <p:tnLst>
+      <p:par>
+        <p:cTn id="1" dur="indefinite" restart="never" nodeType="tmRoot"/>
+      </p:par>
+    </p:tnLst>
+  </p:timing>
 </p:sld>
 </file>
 
@@ -4741,7 +4797,7 @@
           <p:cNvPr id="7" name="TextBox 6">
             <a:extLst>
               <a:ext uri="{FF2B5EF4-FFF2-40B4-BE49-F238E27FC236}">
-                <a16:creationId xmlns:a16="http://schemas.microsoft.com/office/drawing/2014/main" id="{882EAC00-0723-4478-82AE-41368060B6D4}"/>
+                <a16:creationId xmlns:a16="http://schemas.microsoft.com/office/drawing/2014/main" xmlns="" id="{882EAC00-0723-4478-82AE-41368060B6D4}"/>
               </a:ext>
             </a:extLst>
           </p:cNvPr>
@@ -4795,7 +4851,7 @@
           <p:cNvPr id="8" name="Picture 7" descr="The_Tile_Game.pdf - Adobe Acrobat Reader DC">
             <a:extLst>
               <a:ext uri="{FF2B5EF4-FFF2-40B4-BE49-F238E27FC236}">
-                <a16:creationId xmlns:a16="http://schemas.microsoft.com/office/drawing/2014/main" id="{C1D446B4-80CA-44B6-AE80-F4446C2874C9}"/>
+                <a16:creationId xmlns:a16="http://schemas.microsoft.com/office/drawing/2014/main" xmlns="" id="{C1D446B4-80CA-44B6-AE80-F4446C2874C9}"/>
               </a:ext>
             </a:extLst>
           </p:cNvPr>
@@ -4835,7 +4891,7 @@
           <p:cNvPr id="9" name="TextBox 8">
             <a:extLst>
               <a:ext uri="{FF2B5EF4-FFF2-40B4-BE49-F238E27FC236}">
-                <a16:creationId xmlns:a16="http://schemas.microsoft.com/office/drawing/2014/main" id="{CA2092E9-0B3F-4C3A-B4AE-27E81F293862}"/>
+                <a16:creationId xmlns:a16="http://schemas.microsoft.com/office/drawing/2014/main" xmlns="" id="{CA2092E9-0B3F-4C3A-B4AE-27E81F293862}"/>
               </a:ext>
             </a:extLst>
           </p:cNvPr>
@@ -4879,6 +4935,13 @@
   <p:clrMapOvr>
     <a:masterClrMapping/>
   </p:clrMapOvr>
+  <p:timing>
+    <p:tnLst>
+      <p:par>
+        <p:cTn id="1" dur="indefinite" restart="never" nodeType="tmRoot"/>
+      </p:par>
+    </p:tnLst>
+  </p:timing>
 </p:sld>
 </file>
 
@@ -4904,7 +4967,7 @@
           <p:cNvPr id="7" name="TextBox 6">
             <a:extLst>
               <a:ext uri="{FF2B5EF4-FFF2-40B4-BE49-F238E27FC236}">
-                <a16:creationId xmlns:a16="http://schemas.microsoft.com/office/drawing/2014/main" id="{882EAC00-0723-4478-82AE-41368060B6D4}"/>
+                <a16:creationId xmlns:a16="http://schemas.microsoft.com/office/drawing/2014/main" xmlns="" id="{882EAC00-0723-4478-82AE-41368060B6D4}"/>
               </a:ext>
             </a:extLst>
           </p:cNvPr>
@@ -4958,7 +5021,7 @@
           <p:cNvPr id="6" name="TextBox 5">
             <a:extLst>
               <a:ext uri="{FF2B5EF4-FFF2-40B4-BE49-F238E27FC236}">
-                <a16:creationId xmlns:a16="http://schemas.microsoft.com/office/drawing/2014/main" id="{EBE535B4-2F5A-4361-9659-D93E52186A33}"/>
+                <a16:creationId xmlns:a16="http://schemas.microsoft.com/office/drawing/2014/main" xmlns="" id="{EBE535B4-2F5A-4361-9659-D93E52186A33}"/>
               </a:ext>
             </a:extLst>
           </p:cNvPr>
@@ -5023,7 +5086,7 @@
           <p:cNvPr id="4" name="Picture 3" descr="The_Tile_Game.pdf - Adobe Acrobat Reader DC">
             <a:extLst>
               <a:ext uri="{FF2B5EF4-FFF2-40B4-BE49-F238E27FC236}">
-                <a16:creationId xmlns:a16="http://schemas.microsoft.com/office/drawing/2014/main" id="{DA8DDC52-ED85-468C-87E4-A8F5B3462AC5}"/>
+                <a16:creationId xmlns:a16="http://schemas.microsoft.com/office/drawing/2014/main" xmlns="" id="{DA8DDC52-ED85-468C-87E4-A8F5B3462AC5}"/>
               </a:ext>
             </a:extLst>
           </p:cNvPr>
@@ -5068,6 +5131,13 @@
   <p:clrMapOvr>
     <a:masterClrMapping/>
   </p:clrMapOvr>
+  <p:timing>
+    <p:tnLst>
+      <p:par>
+        <p:cTn id="1" dur="indefinite" restart="never" nodeType="tmRoot"/>
+      </p:par>
+    </p:tnLst>
+  </p:timing>
 </p:sld>
 </file>
 
@@ -5093,7 +5163,7 @@
           <p:cNvPr id="7" name="TextBox 6">
             <a:extLst>
               <a:ext uri="{FF2B5EF4-FFF2-40B4-BE49-F238E27FC236}">
-                <a16:creationId xmlns:a16="http://schemas.microsoft.com/office/drawing/2014/main" id="{882EAC00-0723-4478-82AE-41368060B6D4}"/>
+                <a16:creationId xmlns:a16="http://schemas.microsoft.com/office/drawing/2014/main" xmlns="" id="{882EAC00-0723-4478-82AE-41368060B6D4}"/>
               </a:ext>
             </a:extLst>
           </p:cNvPr>
@@ -5147,7 +5217,7 @@
           <p:cNvPr id="3" name="Picture 2" descr="The_Tile_Game.pdf - Adobe Acrobat Reader DC">
             <a:extLst>
               <a:ext uri="{FF2B5EF4-FFF2-40B4-BE49-F238E27FC236}">
-                <a16:creationId xmlns:a16="http://schemas.microsoft.com/office/drawing/2014/main" id="{546D0A79-5523-49F5-A2CA-B4D6AC9944A5}"/>
+                <a16:creationId xmlns:a16="http://schemas.microsoft.com/office/drawing/2014/main" xmlns="" id="{546D0A79-5523-49F5-A2CA-B4D6AC9944A5}"/>
               </a:ext>
             </a:extLst>
           </p:cNvPr>
@@ -5187,7 +5257,7 @@
           <p:cNvPr id="8" name="TextBox 7">
             <a:extLst>
               <a:ext uri="{FF2B5EF4-FFF2-40B4-BE49-F238E27FC236}">
-                <a16:creationId xmlns:a16="http://schemas.microsoft.com/office/drawing/2014/main" id="{D54BECD9-603D-4E4C-82B9-5CFB69FF720F}"/>
+                <a16:creationId xmlns:a16="http://schemas.microsoft.com/office/drawing/2014/main" xmlns="" id="{D54BECD9-603D-4E4C-82B9-5CFB69FF720F}"/>
               </a:ext>
             </a:extLst>
           </p:cNvPr>
@@ -5227,6 +5297,13 @@
   <p:clrMapOvr>
     <a:masterClrMapping/>
   </p:clrMapOvr>
+  <p:timing>
+    <p:tnLst>
+      <p:par>
+        <p:cTn id="1" dur="indefinite" restart="never" nodeType="tmRoot"/>
+      </p:par>
+    </p:tnLst>
+  </p:timing>
 </p:sld>
 </file>
 
@@ -5252,7 +5329,7 @@
           <p:cNvPr id="4" name="TextBox 3">
             <a:extLst>
               <a:ext uri="{FF2B5EF4-FFF2-40B4-BE49-F238E27FC236}">
-                <a16:creationId xmlns:a16="http://schemas.microsoft.com/office/drawing/2014/main" id="{8A67A37A-C488-40D7-A088-6774405888BB}"/>
+                <a16:creationId xmlns:a16="http://schemas.microsoft.com/office/drawing/2014/main" xmlns="" id="{8A67A37A-C488-40D7-A088-6774405888BB}"/>
               </a:ext>
             </a:extLst>
           </p:cNvPr>
@@ -5290,7 +5367,7 @@
           <p:cNvPr id="5" name="TextBox 4">
             <a:extLst>
               <a:ext uri="{FF2B5EF4-FFF2-40B4-BE49-F238E27FC236}">
-                <a16:creationId xmlns:a16="http://schemas.microsoft.com/office/drawing/2014/main" id="{EC931DCA-4690-4B93-9419-BA902293A61A}"/>
+                <a16:creationId xmlns:a16="http://schemas.microsoft.com/office/drawing/2014/main" xmlns="" id="{EC931DCA-4690-4B93-9419-BA902293A61A}"/>
               </a:ext>
             </a:extLst>
           </p:cNvPr>
@@ -5451,6 +5528,13 @@
   <p:clrMapOvr>
     <a:masterClrMapping/>
   </p:clrMapOvr>
+  <p:timing>
+    <p:tnLst>
+      <p:par>
+        <p:cTn id="1" dur="indefinite" restart="never" nodeType="tmRoot"/>
+      </p:par>
+    </p:tnLst>
+  </p:timing>
 </p:sld>
 </file>
 
@@ -5476,7 +5560,7 @@
           <p:cNvPr id="7" name="TextBox 6">
             <a:extLst>
               <a:ext uri="{FF2B5EF4-FFF2-40B4-BE49-F238E27FC236}">
-                <a16:creationId xmlns:a16="http://schemas.microsoft.com/office/drawing/2014/main" id="{882EAC00-0723-4478-82AE-41368060B6D4}"/>
+                <a16:creationId xmlns:a16="http://schemas.microsoft.com/office/drawing/2014/main" xmlns="" id="{882EAC00-0723-4478-82AE-41368060B6D4}"/>
               </a:ext>
             </a:extLst>
           </p:cNvPr>
@@ -5530,7 +5614,7 @@
           <p:cNvPr id="4" name="Picture 3" descr="The_Tile_Game.pdf - Adobe Acrobat Reader DC">
             <a:extLst>
               <a:ext uri="{FF2B5EF4-FFF2-40B4-BE49-F238E27FC236}">
-                <a16:creationId xmlns:a16="http://schemas.microsoft.com/office/drawing/2014/main" id="{4FCDD319-DB14-430E-AA52-AAB4BAED8B54}"/>
+                <a16:creationId xmlns:a16="http://schemas.microsoft.com/office/drawing/2014/main" xmlns="" id="{4FCDD319-DB14-430E-AA52-AAB4BAED8B54}"/>
               </a:ext>
             </a:extLst>
           </p:cNvPr>
@@ -5575,6 +5659,13 @@
   <p:clrMapOvr>
     <a:masterClrMapping/>
   </p:clrMapOvr>
+  <p:timing>
+    <p:tnLst>
+      <p:par>
+        <p:cTn id="1" dur="indefinite" restart="never" nodeType="tmRoot"/>
+      </p:par>
+    </p:tnLst>
+  </p:timing>
 </p:sld>
 </file>
 
@@ -5600,7 +5691,7 @@
           <p:cNvPr id="7" name="TextBox 6">
             <a:extLst>
               <a:ext uri="{FF2B5EF4-FFF2-40B4-BE49-F238E27FC236}">
-                <a16:creationId xmlns:a16="http://schemas.microsoft.com/office/drawing/2014/main" id="{882EAC00-0723-4478-82AE-41368060B6D4}"/>
+                <a16:creationId xmlns:a16="http://schemas.microsoft.com/office/drawing/2014/main" xmlns="" id="{882EAC00-0723-4478-82AE-41368060B6D4}"/>
               </a:ext>
             </a:extLst>
           </p:cNvPr>
@@ -5638,7 +5729,7 @@
           <p:cNvPr id="5" name="TextBox 4">
             <a:extLst>
               <a:ext uri="{FF2B5EF4-FFF2-40B4-BE49-F238E27FC236}">
-                <a16:creationId xmlns:a16="http://schemas.microsoft.com/office/drawing/2014/main" id="{094D4860-AD51-4681-B295-EA05BCEBB2ED}"/>
+                <a16:creationId xmlns:a16="http://schemas.microsoft.com/office/drawing/2014/main" xmlns="" id="{094D4860-AD51-4681-B295-EA05BCEBB2ED}"/>
               </a:ext>
             </a:extLst>
           </p:cNvPr>
@@ -5760,7 +5851,7 @@
           <p:cNvPr id="3" name="Picture 2" descr="The_Tile_Game.pdf - Adobe Acrobat Reader DC">
             <a:extLst>
               <a:ext uri="{FF2B5EF4-FFF2-40B4-BE49-F238E27FC236}">
-                <a16:creationId xmlns:a16="http://schemas.microsoft.com/office/drawing/2014/main" id="{3C1690F0-DFE6-4C40-A3B3-486B65D08E82}"/>
+                <a16:creationId xmlns:a16="http://schemas.microsoft.com/office/drawing/2014/main" xmlns="" id="{3C1690F0-DFE6-4C40-A3B3-486B65D08E82}"/>
               </a:ext>
             </a:extLst>
           </p:cNvPr>
@@ -5805,6 +5896,13 @@
   <p:clrMapOvr>
     <a:masterClrMapping/>
   </p:clrMapOvr>
+  <p:timing>
+    <p:tnLst>
+      <p:par>
+        <p:cTn id="1" dur="indefinite" restart="never" nodeType="tmRoot"/>
+      </p:par>
+    </p:tnLst>
+  </p:timing>
 </p:sld>
 </file>
 
@@ -5830,7 +5928,7 @@
           <p:cNvPr id="4" name="TextBox 3">
             <a:extLst>
               <a:ext uri="{FF2B5EF4-FFF2-40B4-BE49-F238E27FC236}">
-                <a16:creationId xmlns:a16="http://schemas.microsoft.com/office/drawing/2014/main" id="{8A67A37A-C488-40D7-A088-6774405888BB}"/>
+                <a16:creationId xmlns:a16="http://schemas.microsoft.com/office/drawing/2014/main" xmlns="" id="{8A67A37A-C488-40D7-A088-6774405888BB}"/>
               </a:ext>
             </a:extLst>
           </p:cNvPr>
@@ -5868,7 +5966,7 @@
           <p:cNvPr id="5" name="Rectangle 1">
             <a:extLst>
               <a:ext uri="{FF2B5EF4-FFF2-40B4-BE49-F238E27FC236}">
-                <a16:creationId xmlns:a16="http://schemas.microsoft.com/office/drawing/2014/main" id="{E51EE319-5F52-4221-9BD6-52740D2580D7}"/>
+                <a16:creationId xmlns:a16="http://schemas.microsoft.com/office/drawing/2014/main" xmlns="" id="{E51EE319-5F52-4221-9BD6-52740D2580D7}"/>
               </a:ext>
             </a:extLst>
           </p:cNvPr>
@@ -5937,7 +6035,7 @@
           <p:cNvPr id="6" name="Rectangle 5">
             <a:extLst>
               <a:ext uri="{FF2B5EF4-FFF2-40B4-BE49-F238E27FC236}">
-                <a16:creationId xmlns:a16="http://schemas.microsoft.com/office/drawing/2014/main" id="{502DB2D3-B162-4290-B093-D0C812309FC3}"/>
+                <a16:creationId xmlns:a16="http://schemas.microsoft.com/office/drawing/2014/main" xmlns="" id="{502DB2D3-B162-4290-B093-D0C812309FC3}"/>
               </a:ext>
             </a:extLst>
           </p:cNvPr>
@@ -5977,7 +6075,7 @@
           <p:cNvPr id="7" name="Rectangle 6">
             <a:extLst>
               <a:ext uri="{FF2B5EF4-FFF2-40B4-BE49-F238E27FC236}">
-                <a16:creationId xmlns:a16="http://schemas.microsoft.com/office/drawing/2014/main" id="{07E9A15F-2006-46CD-8EA4-7B3107F66E1C}"/>
+                <a16:creationId xmlns:a16="http://schemas.microsoft.com/office/drawing/2014/main" xmlns="" id="{07E9A15F-2006-46CD-8EA4-7B3107F66E1C}"/>
               </a:ext>
             </a:extLst>
           </p:cNvPr>
@@ -6195,6 +6293,13 @@
   <p:clrMapOvr>
     <a:masterClrMapping/>
   </p:clrMapOvr>
+  <p:timing>
+    <p:tnLst>
+      <p:par>
+        <p:cTn id="1" dur="indefinite" restart="never" nodeType="tmRoot"/>
+      </p:par>
+    </p:tnLst>
+  </p:timing>
 </p:sld>
 </file>
 
@@ -6220,7 +6325,7 @@
           <p:cNvPr id="4" name="TextBox 3">
             <a:extLst>
               <a:ext uri="{FF2B5EF4-FFF2-40B4-BE49-F238E27FC236}">
-                <a16:creationId xmlns:a16="http://schemas.microsoft.com/office/drawing/2014/main" id="{8A67A37A-C488-40D7-A088-6774405888BB}"/>
+                <a16:creationId xmlns:a16="http://schemas.microsoft.com/office/drawing/2014/main" xmlns="" id="{8A67A37A-C488-40D7-A088-6774405888BB}"/>
               </a:ext>
             </a:extLst>
           </p:cNvPr>
@@ -6258,7 +6363,7 @@
           <p:cNvPr id="5" name="Rectangle 1">
             <a:extLst>
               <a:ext uri="{FF2B5EF4-FFF2-40B4-BE49-F238E27FC236}">
-                <a16:creationId xmlns:a16="http://schemas.microsoft.com/office/drawing/2014/main" id="{E51EE319-5F52-4221-9BD6-52740D2580D7}"/>
+                <a16:creationId xmlns:a16="http://schemas.microsoft.com/office/drawing/2014/main" xmlns="" id="{E51EE319-5F52-4221-9BD6-52740D2580D7}"/>
               </a:ext>
             </a:extLst>
           </p:cNvPr>
@@ -6327,7 +6432,7 @@
           <p:cNvPr id="6" name="Rectangle 5">
             <a:extLst>
               <a:ext uri="{FF2B5EF4-FFF2-40B4-BE49-F238E27FC236}">
-                <a16:creationId xmlns:a16="http://schemas.microsoft.com/office/drawing/2014/main" id="{502DB2D3-B162-4290-B093-D0C812309FC3}"/>
+                <a16:creationId xmlns:a16="http://schemas.microsoft.com/office/drawing/2014/main" xmlns="" id="{502DB2D3-B162-4290-B093-D0C812309FC3}"/>
               </a:ext>
             </a:extLst>
           </p:cNvPr>
@@ -6367,7 +6472,7 @@
           <p:cNvPr id="9" name="Rectangle 2">
             <a:extLst>
               <a:ext uri="{FF2B5EF4-FFF2-40B4-BE49-F238E27FC236}">
-                <a16:creationId xmlns:a16="http://schemas.microsoft.com/office/drawing/2014/main" id="{97C1BB62-F76A-44D4-AF78-D16C19C3EB65}"/>
+                <a16:creationId xmlns:a16="http://schemas.microsoft.com/office/drawing/2014/main" xmlns="" id="{97C1BB62-F76A-44D4-AF78-D16C19C3EB65}"/>
               </a:ext>
             </a:extLst>
           </p:cNvPr>
@@ -6436,7 +6541,7 @@
           <p:cNvPr id="10" name="Rectangle 9">
             <a:extLst>
               <a:ext uri="{FF2B5EF4-FFF2-40B4-BE49-F238E27FC236}">
-                <a16:creationId xmlns:a16="http://schemas.microsoft.com/office/drawing/2014/main" id="{2240D99A-3DB9-4B55-B867-D90A8C65326A}"/>
+                <a16:creationId xmlns:a16="http://schemas.microsoft.com/office/drawing/2014/main" xmlns="" id="{2240D99A-3DB9-4B55-B867-D90A8C65326A}"/>
               </a:ext>
             </a:extLst>
           </p:cNvPr>
@@ -6526,6 +6631,13 @@
   <p:clrMapOvr>
     <a:masterClrMapping/>
   </p:clrMapOvr>
+  <p:timing>
+    <p:tnLst>
+      <p:par>
+        <p:cTn id="1" dur="indefinite" restart="never" nodeType="tmRoot"/>
+      </p:par>
+    </p:tnLst>
+  </p:timing>
 </p:sld>
 </file>
 
@@ -6551,7 +6663,7 @@
           <p:cNvPr id="7" name="TextBox 6">
             <a:extLst>
               <a:ext uri="{FF2B5EF4-FFF2-40B4-BE49-F238E27FC236}">
-                <a16:creationId xmlns:a16="http://schemas.microsoft.com/office/drawing/2014/main" id="{882EAC00-0723-4478-82AE-41368060B6D4}"/>
+                <a16:creationId xmlns:a16="http://schemas.microsoft.com/office/drawing/2014/main" xmlns="" id="{882EAC00-0723-4478-82AE-41368060B6D4}"/>
               </a:ext>
             </a:extLst>
           </p:cNvPr>
@@ -6589,7 +6701,7 @@
           <p:cNvPr id="8" name="TextBox 7">
             <a:extLst>
               <a:ext uri="{FF2B5EF4-FFF2-40B4-BE49-F238E27FC236}">
-                <a16:creationId xmlns:a16="http://schemas.microsoft.com/office/drawing/2014/main" id="{DB8E92E0-28F9-43D0-80C5-A9B98B82EE36}"/>
+                <a16:creationId xmlns:a16="http://schemas.microsoft.com/office/drawing/2014/main" xmlns="" id="{DB8E92E0-28F9-43D0-80C5-A9B98B82EE36}"/>
               </a:ext>
             </a:extLst>
           </p:cNvPr>
@@ -6656,6 +6768,151 @@
                 <a:sym typeface="Wingdings" panose="05000000000000000000" pitchFamily="2" charset="2"/>
               </a:rPr>
               <a:t>Show that your short programs run and print out the requested information.  Make sure the source code is available for review.</a:t>
+            </a:r>
+            <a:endParaRPr lang="en-US" dirty="0"/>
+          </a:p>
+        </p:txBody>
+      </p:sp>
+      <p:sp>
+        <p:nvSpPr>
+          <p:cNvPr id="4" name="TextBox 3">
+            <a:extLst>
+              <a:ext uri="{FF2B5EF4-FFF2-40B4-BE49-F238E27FC236}">
+                <a16:creationId xmlns:a16="http://schemas.microsoft.com/office/drawing/2014/main" xmlns="" id="{DB8E92E0-28F9-43D0-80C5-A9B98B82EE36}"/>
+              </a:ext>
+            </a:extLst>
+          </p:cNvPr>
+          <p:cNvSpPr txBox="1"/>
+          <p:nvPr/>
+        </p:nvSpPr>
+        <p:spPr>
+          <a:xfrm>
+            <a:off x="269297" y="2826426"/>
+            <a:ext cx="8134066" cy="2308324"/>
+          </a:xfrm>
+          <a:prstGeom prst="rect">
+            <a:avLst/>
+          </a:prstGeom>
+        </p:spPr>
+        <p:txBody>
+          <a:bodyPr rtlCol="0">
+            <a:spAutoFit/>
+          </a:bodyPr>
+          <a:lstStyle/>
+          <a:p>
+            <a:r>
+              <a:rPr lang="en-US" dirty="0" smtClean="0">
+                <a:solidFill>
+                  <a:srgbClr val="002060"/>
+                </a:solidFill>
+              </a:rPr>
+              <a:t>Note: When comparing Strings, do not use ==.</a:t>
+            </a:r>
+          </a:p>
+          <a:p>
+            <a:pPr marL="742950" lvl="1" indent="-285750">
+              <a:buFont typeface="Arial" panose="020B0604020202020204" pitchFamily="34" charset="0"/>
+              <a:buChar char="•"/>
+            </a:pPr>
+            <a:r>
+              <a:rPr lang="en-US" dirty="0" smtClean="0"/>
+              <a:t>This is always wrong, even if sometimes it might happen to give you the correct answer. </a:t>
+            </a:r>
+          </a:p>
+          <a:p>
+            <a:pPr marL="742950" lvl="1" indent="-285750">
+              <a:buFont typeface="Arial" panose="020B0604020202020204" pitchFamily="34" charset="0"/>
+              <a:buChar char="•"/>
+            </a:pPr>
+            <a:r>
+              <a:rPr lang="en-US" dirty="0" smtClean="0">
+                <a:solidFill>
+                  <a:srgbClr val="002060"/>
+                </a:solidFill>
+              </a:rPr>
+              <a:t>== compares memory addresses: for more explanation see: </a:t>
+            </a:r>
+          </a:p>
+          <a:p>
+            <a:pPr lvl="1"/>
+            <a:r>
+              <a:rPr lang="en-US" dirty="0" smtClean="0">
+                <a:solidFill>
+                  <a:srgbClr val="002060"/>
+                </a:solidFill>
+              </a:rPr>
+              <a:t>	</a:t>
+            </a:r>
+            <a:r>
+              <a:rPr lang="en-US" dirty="0" smtClean="0">
+                <a:solidFill>
+                  <a:srgbClr val="002060"/>
+                </a:solidFill>
+                <a:hlinkClick r:id="rId2"/>
+              </a:rPr>
+              <a:t>https</a:t>
+            </a:r>
+            <a:r>
+              <a:rPr lang="en-US" dirty="0">
+                <a:solidFill>
+                  <a:srgbClr val="002060"/>
+                </a:solidFill>
+                <a:hlinkClick r:id="rId2"/>
+              </a:rPr>
+              <a:t>://www.baeldung.com/java-compare-strings</a:t>
+            </a:r>
+            <a:r>
+              <a:rPr lang="en-US" dirty="0">
+                <a:solidFill>
+                  <a:srgbClr val="002060"/>
+                </a:solidFill>
+              </a:rPr>
+              <a:t> </a:t>
+            </a:r>
+            <a:r>
+              <a:rPr lang="en-US" dirty="0" smtClean="0">
+                <a:solidFill>
+                  <a:srgbClr val="002060"/>
+                </a:solidFill>
+              </a:rPr>
+              <a:t> </a:t>
+            </a:r>
+          </a:p>
+          <a:p>
+            <a:pPr marL="1200150" lvl="2" indent="-285750">
+              <a:buFont typeface="Arial" panose="020B0604020202020204" pitchFamily="34" charset="0"/>
+              <a:buChar char="•"/>
+            </a:pPr>
+            <a:r>
+              <a:rPr lang="en-US" dirty="0" smtClean="0">
+                <a:solidFill>
+                  <a:srgbClr val="002060"/>
+                </a:solidFill>
+              </a:rPr>
+              <a:t>in some cases two String variables with the same content will point to the same memory location, but not always – you should not assume this</a:t>
+            </a:r>
+            <a:endParaRPr lang="en-US" dirty="0" smtClean="0">
+              <a:solidFill>
+                <a:srgbClr val="7030A0"/>
+              </a:solidFill>
+            </a:endParaRPr>
+          </a:p>
+          <a:p>
+            <a:pPr marL="742950" lvl="1" indent="-285750">
+              <a:buFont typeface="Arial" panose="020B0604020202020204" pitchFamily="34" charset="0"/>
+              <a:buChar char="•"/>
+            </a:pPr>
+            <a:r>
+              <a:rPr lang="en-US" dirty="0" smtClean="0"/>
+              <a:t>String methods that you can use instead: .equals(), .</a:t>
+            </a:r>
+            <a:r>
+              <a:rPr lang="en-US" dirty="0" err="1" smtClean="0"/>
+              <a:t>equalsIgnoreCase</a:t>
+            </a:r>
+            <a:r>
+              <a:rPr lang="en-US" dirty="0" smtClean="0"/>
+              <a:t>(), etc.</a:t>
             </a:r>
             <a:endParaRPr lang="en-US" dirty="0"/>
           </a:p>
@@ -6671,6 +6928,13 @@
   <p:clrMapOvr>
     <a:masterClrMapping/>
   </p:clrMapOvr>
+  <p:timing>
+    <p:tnLst>
+      <p:par>
+        <p:cTn id="1" dur="indefinite" restart="never" nodeType="tmRoot"/>
+      </p:par>
+    </p:tnLst>
+  </p:timing>
 </p:sld>
 </file>
 
@@ -6696,7 +6960,7 @@
           <p:cNvPr id="7" name="TextBox 6">
             <a:extLst>
               <a:ext uri="{FF2B5EF4-FFF2-40B4-BE49-F238E27FC236}">
-                <a16:creationId xmlns:a16="http://schemas.microsoft.com/office/drawing/2014/main" id="{882EAC00-0723-4478-82AE-41368060B6D4}"/>
+                <a16:creationId xmlns:a16="http://schemas.microsoft.com/office/drawing/2014/main" xmlns="" id="{882EAC00-0723-4478-82AE-41368060B6D4}"/>
               </a:ext>
             </a:extLst>
           </p:cNvPr>
@@ -6734,7 +6998,7 @@
           <p:cNvPr id="8" name="TextBox 7">
             <a:extLst>
               <a:ext uri="{FF2B5EF4-FFF2-40B4-BE49-F238E27FC236}">
-                <a16:creationId xmlns:a16="http://schemas.microsoft.com/office/drawing/2014/main" id="{DB8E92E0-28F9-43D0-80C5-A9B98B82EE36}"/>
+                <a16:creationId xmlns:a16="http://schemas.microsoft.com/office/drawing/2014/main" xmlns="" id="{DB8E92E0-28F9-43D0-80C5-A9B98B82EE36}"/>
               </a:ext>
             </a:extLst>
           </p:cNvPr>
@@ -6859,6 +7123,13 @@
   <p:clrMapOvr>
     <a:masterClrMapping/>
   </p:clrMapOvr>
+  <p:timing>
+    <p:tnLst>
+      <p:par>
+        <p:cTn id="1" dur="indefinite" restart="never" nodeType="tmRoot"/>
+      </p:par>
+    </p:tnLst>
+  </p:timing>
 </p:sld>
 </file>
 
@@ -6884,7 +7155,7 @@
           <p:cNvPr id="7" name="TextBox 6">
             <a:extLst>
               <a:ext uri="{FF2B5EF4-FFF2-40B4-BE49-F238E27FC236}">
-                <a16:creationId xmlns:a16="http://schemas.microsoft.com/office/drawing/2014/main" id="{882EAC00-0723-4478-82AE-41368060B6D4}"/>
+                <a16:creationId xmlns:a16="http://schemas.microsoft.com/office/drawing/2014/main" xmlns="" id="{882EAC00-0723-4478-82AE-41368060B6D4}"/>
               </a:ext>
             </a:extLst>
           </p:cNvPr>
@@ -6922,7 +7193,7 @@
           <p:cNvPr id="8" name="TextBox 7">
             <a:extLst>
               <a:ext uri="{FF2B5EF4-FFF2-40B4-BE49-F238E27FC236}">
-                <a16:creationId xmlns:a16="http://schemas.microsoft.com/office/drawing/2014/main" id="{DB8E92E0-28F9-43D0-80C5-A9B98B82EE36}"/>
+                <a16:creationId xmlns:a16="http://schemas.microsoft.com/office/drawing/2014/main" xmlns="" id="{DB8E92E0-28F9-43D0-80C5-A9B98B82EE36}"/>
               </a:ext>
             </a:extLst>
           </p:cNvPr>
@@ -7069,6 +7340,13 @@
   <p:clrMapOvr>
     <a:masterClrMapping/>
   </p:clrMapOvr>
+  <p:timing>
+    <p:tnLst>
+      <p:par>
+        <p:cTn id="1" dur="indefinite" restart="never" nodeType="tmRoot"/>
+      </p:par>
+    </p:tnLst>
+  </p:timing>
 </p:sld>
 </file>
 
@@ -7094,7 +7372,7 @@
           <p:cNvPr id="7" name="TextBox 6">
             <a:extLst>
               <a:ext uri="{FF2B5EF4-FFF2-40B4-BE49-F238E27FC236}">
-                <a16:creationId xmlns:a16="http://schemas.microsoft.com/office/drawing/2014/main" id="{882EAC00-0723-4478-82AE-41368060B6D4}"/>
+                <a16:creationId xmlns:a16="http://schemas.microsoft.com/office/drawing/2014/main" xmlns="" id="{882EAC00-0723-4478-82AE-41368060B6D4}"/>
               </a:ext>
             </a:extLst>
           </p:cNvPr>
@@ -7132,7 +7410,7 @@
           <p:cNvPr id="3" name="Picture 2" descr="The_Tile_Game.pdf - Adobe Acrobat Reader DC">
             <a:extLst>
               <a:ext uri="{FF2B5EF4-FFF2-40B4-BE49-F238E27FC236}">
-                <a16:creationId xmlns:a16="http://schemas.microsoft.com/office/drawing/2014/main" id="{5F395B11-0174-4728-B7C3-4EF29B738814}"/>
+                <a16:creationId xmlns:a16="http://schemas.microsoft.com/office/drawing/2014/main" xmlns="" id="{5F395B11-0174-4728-B7C3-4EF29B738814}"/>
               </a:ext>
             </a:extLst>
           </p:cNvPr>
@@ -7172,7 +7450,7 @@
           <p:cNvPr id="4" name="TextBox 3">
             <a:extLst>
               <a:ext uri="{FF2B5EF4-FFF2-40B4-BE49-F238E27FC236}">
-                <a16:creationId xmlns:a16="http://schemas.microsoft.com/office/drawing/2014/main" id="{999888BB-AEF6-4586-B106-50A0036A675D}"/>
+                <a16:creationId xmlns:a16="http://schemas.microsoft.com/office/drawing/2014/main" xmlns="" id="{999888BB-AEF6-4586-B106-50A0036A675D}"/>
               </a:ext>
             </a:extLst>
           </p:cNvPr>
@@ -7207,7 +7485,7 @@
           <p:cNvPr id="12" name="Picture 11" descr="15 Puzzle: A sliding tile game - Thonky.com - Mozilla Firefox">
             <a:extLst>
               <a:ext uri="{FF2B5EF4-FFF2-40B4-BE49-F238E27FC236}">
-                <a16:creationId xmlns:a16="http://schemas.microsoft.com/office/drawing/2014/main" id="{28D3D2E7-8A04-454E-8A7A-2FA97F116D63}"/>
+                <a16:creationId xmlns:a16="http://schemas.microsoft.com/office/drawing/2014/main" xmlns="" id="{28D3D2E7-8A04-454E-8A7A-2FA97F116D63}"/>
               </a:ext>
             </a:extLst>
           </p:cNvPr>
@@ -7242,7 +7520,7 @@
           <p:cNvPr id="13" name="TextBox 12">
             <a:extLst>
               <a:ext uri="{FF2B5EF4-FFF2-40B4-BE49-F238E27FC236}">
-                <a16:creationId xmlns:a16="http://schemas.microsoft.com/office/drawing/2014/main" id="{86BC7574-DA6A-4B8C-B1F2-AE801FF9AD20}"/>
+                <a16:creationId xmlns:a16="http://schemas.microsoft.com/office/drawing/2014/main" xmlns="" id="{86BC7574-DA6A-4B8C-B1F2-AE801FF9AD20}"/>
               </a:ext>
             </a:extLst>
           </p:cNvPr>
@@ -7277,7 +7555,7 @@
           <p:cNvPr id="15" name="Picture 14" descr="C:\Users\Karin\Google Drive\CS\CS401PF\sample_output_tile_game.txt - Notepad++">
             <a:extLst>
               <a:ext uri="{FF2B5EF4-FFF2-40B4-BE49-F238E27FC236}">
-                <a16:creationId xmlns:a16="http://schemas.microsoft.com/office/drawing/2014/main" id="{6EADA397-DB46-4A20-81DD-9C26CC37DEC2}"/>
+                <a16:creationId xmlns:a16="http://schemas.microsoft.com/office/drawing/2014/main" xmlns="" id="{6EADA397-DB46-4A20-81DD-9C26CC37DEC2}"/>
               </a:ext>
             </a:extLst>
           </p:cNvPr>
@@ -7317,6 +7595,13 @@
   <p:clrMapOvr>
     <a:masterClrMapping/>
   </p:clrMapOvr>
+  <p:timing>
+    <p:tnLst>
+      <p:par>
+        <p:cTn id="1" dur="indefinite" restart="never" nodeType="tmRoot"/>
+      </p:par>
+    </p:tnLst>
+  </p:timing>
 </p:sld>
 </file>
 
@@ -7342,7 +7627,7 @@
           <p:cNvPr id="7" name="TextBox 6">
             <a:extLst>
               <a:ext uri="{FF2B5EF4-FFF2-40B4-BE49-F238E27FC236}">
-                <a16:creationId xmlns:a16="http://schemas.microsoft.com/office/drawing/2014/main" id="{882EAC00-0723-4478-82AE-41368060B6D4}"/>
+                <a16:creationId xmlns:a16="http://schemas.microsoft.com/office/drawing/2014/main" xmlns="" id="{882EAC00-0723-4478-82AE-41368060B6D4}"/>
               </a:ext>
             </a:extLst>
           </p:cNvPr>
@@ -7380,7 +7665,7 @@
           <p:cNvPr id="4" name="TextBox 3">
             <a:extLst>
               <a:ext uri="{FF2B5EF4-FFF2-40B4-BE49-F238E27FC236}">
-                <a16:creationId xmlns:a16="http://schemas.microsoft.com/office/drawing/2014/main" id="{E3C27F4F-95B1-4A6D-9E5C-E5985EB86477}"/>
+                <a16:creationId xmlns:a16="http://schemas.microsoft.com/office/drawing/2014/main" xmlns="" id="{E3C27F4F-95B1-4A6D-9E5C-E5985EB86477}"/>
               </a:ext>
             </a:extLst>
           </p:cNvPr>
@@ -7461,6 +7746,13 @@
   <p:clrMapOvr>
     <a:masterClrMapping/>
   </p:clrMapOvr>
+  <p:timing>
+    <p:tnLst>
+      <p:par>
+        <p:cTn id="1" dur="indefinite" restart="never" nodeType="tmRoot"/>
+      </p:par>
+    </p:tnLst>
+  </p:timing>
 </p:sld>
 </file>
 

</xml_diff>

<commit_message>
correction in description of how game board is initialized (see slide 12)
</commit_message>
<xml_diff>
--- a/cs401_1_27_20.pptx
+++ b/cs401_1_27_20.pptx
@@ -240,7 +240,7 @@
           <a:p>
             <a:fld id="{040C7ED3-6993-4347-B443-83F433321F8D}" type="datetimeFigureOut">
               <a:rPr lang="en-US" smtClean="0"/>
-              <a:t>1/27/2020</a:t>
+              <a:t>1/31/2020</a:t>
             </a:fld>
             <a:endParaRPr lang="en-US"/>
           </a:p>
@@ -638,7 +638,7 @@
           <a:p>
             <a:fld id="{331D76CF-5E7C-420B-89A3-7189BACB8345}" type="datetimeFigureOut">
               <a:rPr lang="en-US" smtClean="0"/>
-              <a:t>1/27/2020</a:t>
+              <a:t>1/31/2020</a:t>
             </a:fld>
             <a:endParaRPr lang="en-US"/>
           </a:p>
@@ -808,7 +808,7 @@
           <a:p>
             <a:fld id="{331D76CF-5E7C-420B-89A3-7189BACB8345}" type="datetimeFigureOut">
               <a:rPr lang="en-US" smtClean="0"/>
-              <a:t>1/27/2020</a:t>
+              <a:t>1/31/2020</a:t>
             </a:fld>
             <a:endParaRPr lang="en-US"/>
           </a:p>
@@ -988,7 +988,7 @@
           <a:p>
             <a:fld id="{331D76CF-5E7C-420B-89A3-7189BACB8345}" type="datetimeFigureOut">
               <a:rPr lang="en-US" smtClean="0"/>
-              <a:t>1/27/2020</a:t>
+              <a:t>1/31/2020</a:t>
             </a:fld>
             <a:endParaRPr lang="en-US"/>
           </a:p>
@@ -1158,7 +1158,7 @@
           <a:p>
             <a:fld id="{331D76CF-5E7C-420B-89A3-7189BACB8345}" type="datetimeFigureOut">
               <a:rPr lang="en-US" smtClean="0"/>
-              <a:t>1/27/2020</a:t>
+              <a:t>1/31/2020</a:t>
             </a:fld>
             <a:endParaRPr lang="en-US"/>
           </a:p>
@@ -1402,7 +1402,7 @@
           <a:p>
             <a:fld id="{331D76CF-5E7C-420B-89A3-7189BACB8345}" type="datetimeFigureOut">
               <a:rPr lang="en-US" smtClean="0"/>
-              <a:t>1/27/2020</a:t>
+              <a:t>1/31/2020</a:t>
             </a:fld>
             <a:endParaRPr lang="en-US"/>
           </a:p>
@@ -1634,7 +1634,7 @@
           <a:p>
             <a:fld id="{331D76CF-5E7C-420B-89A3-7189BACB8345}" type="datetimeFigureOut">
               <a:rPr lang="en-US" smtClean="0"/>
-              <a:t>1/27/2020</a:t>
+              <a:t>1/31/2020</a:t>
             </a:fld>
             <a:endParaRPr lang="en-US"/>
           </a:p>
@@ -2001,7 +2001,7 @@
           <a:p>
             <a:fld id="{331D76CF-5E7C-420B-89A3-7189BACB8345}" type="datetimeFigureOut">
               <a:rPr lang="en-US" smtClean="0"/>
-              <a:t>1/27/2020</a:t>
+              <a:t>1/31/2020</a:t>
             </a:fld>
             <a:endParaRPr lang="en-US"/>
           </a:p>
@@ -2119,7 +2119,7 @@
           <a:p>
             <a:fld id="{331D76CF-5E7C-420B-89A3-7189BACB8345}" type="datetimeFigureOut">
               <a:rPr lang="en-US" smtClean="0"/>
-              <a:t>1/27/2020</a:t>
+              <a:t>1/31/2020</a:t>
             </a:fld>
             <a:endParaRPr lang="en-US"/>
           </a:p>
@@ -2214,7 +2214,7 @@
           <a:p>
             <a:fld id="{331D76CF-5E7C-420B-89A3-7189BACB8345}" type="datetimeFigureOut">
               <a:rPr lang="en-US" smtClean="0"/>
-              <a:t>1/27/2020</a:t>
+              <a:t>1/31/2020</a:t>
             </a:fld>
             <a:endParaRPr lang="en-US"/>
           </a:p>
@@ -2491,7 +2491,7 @@
           <a:p>
             <a:fld id="{331D76CF-5E7C-420B-89A3-7189BACB8345}" type="datetimeFigureOut">
               <a:rPr lang="en-US" smtClean="0"/>
-              <a:t>1/27/2020</a:t>
+              <a:t>1/31/2020</a:t>
             </a:fld>
             <a:endParaRPr lang="en-US"/>
           </a:p>
@@ -2748,7 +2748,7 @@
           <a:p>
             <a:fld id="{331D76CF-5E7C-420B-89A3-7189BACB8345}" type="datetimeFigureOut">
               <a:rPr lang="en-US" smtClean="0"/>
-              <a:t>1/27/2020</a:t>
+              <a:t>1/31/2020</a:t>
             </a:fld>
             <a:endParaRPr lang="en-US"/>
           </a:p>
@@ -2961,7 +2961,7 @@
           <a:p>
             <a:fld id="{331D76CF-5E7C-420B-89A3-7189BACB8345}" type="datetimeFigureOut">
               <a:rPr lang="en-US" smtClean="0"/>
-              <a:t>1/27/2020</a:t>
+              <a:t>1/31/2020</a:t>
             </a:fld>
             <a:endParaRPr lang="en-US"/>
           </a:p>
@@ -3371,7 +3371,7 @@
           <p:cNvPr id="4" name="TextBox 3">
             <a:extLst>
               <a:ext uri="{FF2B5EF4-FFF2-40B4-BE49-F238E27FC236}">
-                <a16:creationId xmlns:a16="http://schemas.microsoft.com/office/drawing/2014/main" xmlns="" id="{8A67A37A-C488-40D7-A088-6774405888BB}"/>
+                <a16:creationId xmlns:a16="http://schemas.microsoft.com/office/drawing/2014/main" id="{8A67A37A-C488-40D7-A088-6774405888BB}"/>
               </a:ext>
             </a:extLst>
           </p:cNvPr>
@@ -3409,7 +3409,7 @@
           <p:cNvPr id="5" name="TextBox 4">
             <a:extLst>
               <a:ext uri="{FF2B5EF4-FFF2-40B4-BE49-F238E27FC236}">
-                <a16:creationId xmlns:a16="http://schemas.microsoft.com/office/drawing/2014/main" xmlns="" id="{EC931DCA-4690-4B93-9419-BA902293A61A}"/>
+                <a16:creationId xmlns:a16="http://schemas.microsoft.com/office/drawing/2014/main" id="{EC931DCA-4690-4B93-9419-BA902293A61A}"/>
               </a:ext>
             </a:extLst>
           </p:cNvPr>
@@ -3568,13 +3568,6 @@
   <p:clrMapOvr>
     <a:masterClrMapping/>
   </p:clrMapOvr>
-  <p:timing>
-    <p:tnLst>
-      <p:par>
-        <p:cTn id="1" dur="indefinite" restart="never" nodeType="tmRoot"/>
-      </p:par>
-    </p:tnLst>
-  </p:timing>
 </p:sld>
 </file>
 
@@ -3600,7 +3593,7 @@
           <p:cNvPr id="7" name="TextBox 6">
             <a:extLst>
               <a:ext uri="{FF2B5EF4-FFF2-40B4-BE49-F238E27FC236}">
-                <a16:creationId xmlns:a16="http://schemas.microsoft.com/office/drawing/2014/main" xmlns="" id="{882EAC00-0723-4478-82AE-41368060B6D4}"/>
+                <a16:creationId xmlns:a16="http://schemas.microsoft.com/office/drawing/2014/main" id="{882EAC00-0723-4478-82AE-41368060B6D4}"/>
               </a:ext>
             </a:extLst>
           </p:cNvPr>
@@ -3638,7 +3631,7 @@
           <p:cNvPr id="5" name="Picture 4" descr="The_Tile_Game.pdf - Adobe Acrobat Reader DC">
             <a:extLst>
               <a:ext uri="{FF2B5EF4-FFF2-40B4-BE49-F238E27FC236}">
-                <a16:creationId xmlns:a16="http://schemas.microsoft.com/office/drawing/2014/main" xmlns="" id="{F0889651-F4DB-45CB-9F1C-D24E36A26104}"/>
+                <a16:creationId xmlns:a16="http://schemas.microsoft.com/office/drawing/2014/main" id="{F0889651-F4DB-45CB-9F1C-D24E36A26104}"/>
               </a:ext>
             </a:extLst>
           </p:cNvPr>
@@ -3683,13 +3676,6 @@
   <p:clrMapOvr>
     <a:masterClrMapping/>
   </p:clrMapOvr>
-  <p:timing>
-    <p:tnLst>
-      <p:par>
-        <p:cTn id="1" dur="indefinite" restart="never" nodeType="tmRoot"/>
-      </p:par>
-    </p:tnLst>
-  </p:timing>
 </p:sld>
 </file>
 
@@ -3715,7 +3701,7 @@
           <p:cNvPr id="7" name="TextBox 6">
             <a:extLst>
               <a:ext uri="{FF2B5EF4-FFF2-40B4-BE49-F238E27FC236}">
-                <a16:creationId xmlns:a16="http://schemas.microsoft.com/office/drawing/2014/main" xmlns="" id="{882EAC00-0723-4478-82AE-41368060B6D4}"/>
+                <a16:creationId xmlns:a16="http://schemas.microsoft.com/office/drawing/2014/main" id="{882EAC00-0723-4478-82AE-41368060B6D4}"/>
               </a:ext>
             </a:extLst>
           </p:cNvPr>
@@ -3753,7 +3739,7 @@
           <p:cNvPr id="3" name="Picture 2" descr="The_Tile_Game.pdf - Adobe Acrobat Reader DC">
             <a:extLst>
               <a:ext uri="{FF2B5EF4-FFF2-40B4-BE49-F238E27FC236}">
-                <a16:creationId xmlns:a16="http://schemas.microsoft.com/office/drawing/2014/main" xmlns="" id="{4AD9A04C-4A97-4DDC-AEBA-05B40DE7BF58}"/>
+                <a16:creationId xmlns:a16="http://schemas.microsoft.com/office/drawing/2014/main" id="{4AD9A04C-4A97-4DDC-AEBA-05B40DE7BF58}"/>
               </a:ext>
             </a:extLst>
           </p:cNvPr>
@@ -3793,7 +3779,7 @@
           <p:cNvPr id="5" name="TextBox 4">
             <a:extLst>
               <a:ext uri="{FF2B5EF4-FFF2-40B4-BE49-F238E27FC236}">
-                <a16:creationId xmlns:a16="http://schemas.microsoft.com/office/drawing/2014/main" xmlns="" id="{2C212B8D-B3FE-4D6D-9564-0B6B9ABCF88C}"/>
+                <a16:creationId xmlns:a16="http://schemas.microsoft.com/office/drawing/2014/main" id="{2C212B8D-B3FE-4D6D-9564-0B6B9ABCF88C}"/>
               </a:ext>
             </a:extLst>
           </p:cNvPr>
@@ -3833,13 +3819,6 @@
   <p:clrMapOvr>
     <a:masterClrMapping/>
   </p:clrMapOvr>
-  <p:timing>
-    <p:tnLst>
-      <p:par>
-        <p:cTn id="1" dur="indefinite" restart="never" nodeType="tmRoot"/>
-      </p:par>
-    </p:tnLst>
-  </p:timing>
 </p:sld>
 </file>
 
@@ -3865,7 +3844,7 @@
           <p:cNvPr id="7" name="TextBox 6">
             <a:extLst>
               <a:ext uri="{FF2B5EF4-FFF2-40B4-BE49-F238E27FC236}">
-                <a16:creationId xmlns:a16="http://schemas.microsoft.com/office/drawing/2014/main" xmlns="" id="{882EAC00-0723-4478-82AE-41368060B6D4}"/>
+                <a16:creationId xmlns:a16="http://schemas.microsoft.com/office/drawing/2014/main" id="{882EAC00-0723-4478-82AE-41368060B6D4}"/>
               </a:ext>
             </a:extLst>
           </p:cNvPr>
@@ -3903,7 +3882,7 @@
           <p:cNvPr id="5" name="TextBox 4">
             <a:extLst>
               <a:ext uri="{FF2B5EF4-FFF2-40B4-BE49-F238E27FC236}">
-                <a16:creationId xmlns:a16="http://schemas.microsoft.com/office/drawing/2014/main" xmlns="" id="{2C212B8D-B3FE-4D6D-9564-0B6B9ABCF88C}"/>
+                <a16:creationId xmlns:a16="http://schemas.microsoft.com/office/drawing/2014/main" id="{2C212B8D-B3FE-4D6D-9564-0B6B9ABCF88C}"/>
               </a:ext>
             </a:extLst>
           </p:cNvPr>
@@ -3913,7 +3892,7 @@
         <p:spPr>
           <a:xfrm>
             <a:off x="78564" y="3681662"/>
-            <a:ext cx="7976937" cy="1477328"/>
+            <a:ext cx="7976937" cy="646331"/>
           </a:xfrm>
           <a:prstGeom prst="rect">
             <a:avLst/>
@@ -3932,7 +3911,7 @@
             </a:pPr>
             <a:r>
               <a:rPr lang="en-US" dirty="0"/>
-              <a:t>You’ll want to declare these 2D arrays after the line “public class </a:t>
+              <a:t>You’ll want to declare and initialize the values of these 2D arrays after the line “public class </a:t>
             </a:r>
             <a:r>
               <a:rPr lang="en-US" dirty="0" err="1"/>
@@ -3941,31 +3920,6 @@
             <a:r>
               <a:rPr lang="en-US" dirty="0"/>
               <a:t> {…” and before the main method. </a:t>
-            </a:r>
-          </a:p>
-          <a:p>
-            <a:pPr marL="342900" indent="-342900">
-              <a:buFont typeface="+mj-lt"/>
-              <a:buAutoNum type="arabicPeriod"/>
-            </a:pPr>
-            <a:endParaRPr lang="en-US" dirty="0"/>
-          </a:p>
-          <a:p>
-            <a:pPr marL="342900" indent="-342900">
-              <a:buFont typeface="+mj-lt"/>
-              <a:buAutoNum type="arabicPeriod"/>
-            </a:pPr>
-            <a:r>
-              <a:rPr lang="en-US" strike="sngStrike" dirty="0"/>
-              <a:t>You’ll fill in the actual values (shown above) in the </a:t>
-            </a:r>
-            <a:r>
-              <a:rPr lang="en-US" strike="sngStrike" dirty="0" err="1"/>
-              <a:t>initializeGame</a:t>
-            </a:r>
-            <a:r>
-              <a:rPr lang="en-US" strike="sngStrike" dirty="0"/>
-              <a:t> method (to be described on a later slide).</a:t>
             </a:r>
           </a:p>
         </p:txBody>
@@ -3975,7 +3929,7 @@
           <p:cNvPr id="8" name="Picture 7" descr="The_Tile_Game.pdf - Adobe Acrobat Reader DC">
             <a:extLst>
               <a:ext uri="{FF2B5EF4-FFF2-40B4-BE49-F238E27FC236}">
-                <a16:creationId xmlns:a16="http://schemas.microsoft.com/office/drawing/2014/main" xmlns="" id="{207EB044-CA9A-4D3C-9B01-4686469F46FD}"/>
+                <a16:creationId xmlns:a16="http://schemas.microsoft.com/office/drawing/2014/main" id="{207EB044-CA9A-4D3C-9B01-4686469F46FD}"/>
               </a:ext>
             </a:extLst>
           </p:cNvPr>
@@ -4020,13 +3974,6 @@
   <p:clrMapOvr>
     <a:masterClrMapping/>
   </p:clrMapOvr>
-  <p:timing>
-    <p:tnLst>
-      <p:par>
-        <p:cTn id="1" dur="indefinite" restart="never" nodeType="tmRoot"/>
-      </p:par>
-    </p:tnLst>
-  </p:timing>
 </p:sld>
 </file>
 
@@ -4052,7 +3999,7 @@
           <p:cNvPr id="7" name="TextBox 6">
             <a:extLst>
               <a:ext uri="{FF2B5EF4-FFF2-40B4-BE49-F238E27FC236}">
-                <a16:creationId xmlns:a16="http://schemas.microsoft.com/office/drawing/2014/main" xmlns="" id="{882EAC00-0723-4478-82AE-41368060B6D4}"/>
+                <a16:creationId xmlns:a16="http://schemas.microsoft.com/office/drawing/2014/main" id="{882EAC00-0723-4478-82AE-41368060B6D4}"/>
               </a:ext>
             </a:extLst>
           </p:cNvPr>
@@ -4090,7 +4037,7 @@
           <p:cNvPr id="5" name="TextBox 4">
             <a:extLst>
               <a:ext uri="{FF2B5EF4-FFF2-40B4-BE49-F238E27FC236}">
-                <a16:creationId xmlns:a16="http://schemas.microsoft.com/office/drawing/2014/main" xmlns="" id="{2C212B8D-B3FE-4D6D-9564-0B6B9ABCF88C}"/>
+                <a16:creationId xmlns:a16="http://schemas.microsoft.com/office/drawing/2014/main" id="{2C212B8D-B3FE-4D6D-9564-0B6B9ABCF88C}"/>
               </a:ext>
             </a:extLst>
           </p:cNvPr>
@@ -4163,7 +4110,7 @@
           <p:cNvPr id="3" name="Picture 2" descr="The_Tile_Game.pdf - Adobe Acrobat Reader DC">
             <a:extLst>
               <a:ext uri="{FF2B5EF4-FFF2-40B4-BE49-F238E27FC236}">
-                <a16:creationId xmlns:a16="http://schemas.microsoft.com/office/drawing/2014/main" xmlns="" id="{BB3DC201-7163-4F9A-A9FD-29123E083DD6}"/>
+                <a16:creationId xmlns:a16="http://schemas.microsoft.com/office/drawing/2014/main" id="{BB3DC201-7163-4F9A-A9FD-29123E083DD6}"/>
               </a:ext>
             </a:extLst>
           </p:cNvPr>
@@ -4208,13 +4155,6 @@
   <p:clrMapOvr>
     <a:masterClrMapping/>
   </p:clrMapOvr>
-  <p:timing>
-    <p:tnLst>
-      <p:par>
-        <p:cTn id="1" dur="indefinite" restart="never" nodeType="tmRoot"/>
-      </p:par>
-    </p:tnLst>
-  </p:timing>
 </p:sld>
 </file>
 
@@ -4240,7 +4180,7 @@
           <p:cNvPr id="7" name="TextBox 6">
             <a:extLst>
               <a:ext uri="{FF2B5EF4-FFF2-40B4-BE49-F238E27FC236}">
-                <a16:creationId xmlns:a16="http://schemas.microsoft.com/office/drawing/2014/main" xmlns="" id="{882EAC00-0723-4478-82AE-41368060B6D4}"/>
+                <a16:creationId xmlns:a16="http://schemas.microsoft.com/office/drawing/2014/main" id="{882EAC00-0723-4478-82AE-41368060B6D4}"/>
               </a:ext>
             </a:extLst>
           </p:cNvPr>
@@ -4294,7 +4234,7 @@
           <p:cNvPr id="5" name="TextBox 4">
             <a:extLst>
               <a:ext uri="{FF2B5EF4-FFF2-40B4-BE49-F238E27FC236}">
-                <a16:creationId xmlns:a16="http://schemas.microsoft.com/office/drawing/2014/main" xmlns="" id="{2C212B8D-B3FE-4D6D-9564-0B6B9ABCF88C}"/>
+                <a16:creationId xmlns:a16="http://schemas.microsoft.com/office/drawing/2014/main" id="{2C212B8D-B3FE-4D6D-9564-0B6B9ABCF88C}"/>
               </a:ext>
             </a:extLst>
           </p:cNvPr>
@@ -4360,7 +4300,7 @@
           <p:cNvPr id="10" name="Picture 9" descr="The_Tile_Game.pdf - Adobe Acrobat Reader DC">
             <a:extLst>
               <a:ext uri="{FF2B5EF4-FFF2-40B4-BE49-F238E27FC236}">
-                <a16:creationId xmlns:a16="http://schemas.microsoft.com/office/drawing/2014/main" xmlns="" id="{8390E7A5-DE75-4DEB-923E-CFEF6C4B1506}"/>
+                <a16:creationId xmlns:a16="http://schemas.microsoft.com/office/drawing/2014/main" id="{8390E7A5-DE75-4DEB-923E-CFEF6C4B1506}"/>
               </a:ext>
             </a:extLst>
           </p:cNvPr>
@@ -4405,13 +4345,6 @@
   <p:clrMapOvr>
     <a:masterClrMapping/>
   </p:clrMapOvr>
-  <p:timing>
-    <p:tnLst>
-      <p:par>
-        <p:cTn id="1" dur="indefinite" restart="never" nodeType="tmRoot"/>
-      </p:par>
-    </p:tnLst>
-  </p:timing>
 </p:sld>
 </file>
 
@@ -4437,7 +4370,7 @@
           <p:cNvPr id="7" name="TextBox 6">
             <a:extLst>
               <a:ext uri="{FF2B5EF4-FFF2-40B4-BE49-F238E27FC236}">
-                <a16:creationId xmlns:a16="http://schemas.microsoft.com/office/drawing/2014/main" xmlns="" id="{882EAC00-0723-4478-82AE-41368060B6D4}"/>
+                <a16:creationId xmlns:a16="http://schemas.microsoft.com/office/drawing/2014/main" id="{882EAC00-0723-4478-82AE-41368060B6D4}"/>
               </a:ext>
             </a:extLst>
           </p:cNvPr>
@@ -4491,7 +4424,7 @@
           <p:cNvPr id="5" name="TextBox 4">
             <a:extLst>
               <a:ext uri="{FF2B5EF4-FFF2-40B4-BE49-F238E27FC236}">
-                <a16:creationId xmlns:a16="http://schemas.microsoft.com/office/drawing/2014/main" xmlns="" id="{2C212B8D-B3FE-4D6D-9564-0B6B9ABCF88C}"/>
+                <a16:creationId xmlns:a16="http://schemas.microsoft.com/office/drawing/2014/main" id="{2C212B8D-B3FE-4D6D-9564-0B6B9ABCF88C}"/>
               </a:ext>
             </a:extLst>
           </p:cNvPr>
@@ -4540,7 +4473,7 @@
           <p:cNvPr id="3" name="Picture 2" descr="The_Tile_Game.pdf - Adobe Acrobat Reader DC">
             <a:extLst>
               <a:ext uri="{FF2B5EF4-FFF2-40B4-BE49-F238E27FC236}">
-                <a16:creationId xmlns:a16="http://schemas.microsoft.com/office/drawing/2014/main" xmlns="" id="{2A177AEE-B2CB-4945-8F21-30B224347DDE}"/>
+                <a16:creationId xmlns:a16="http://schemas.microsoft.com/office/drawing/2014/main" id="{2A177AEE-B2CB-4945-8F21-30B224347DDE}"/>
               </a:ext>
             </a:extLst>
           </p:cNvPr>
@@ -4585,13 +4518,6 @@
   <p:clrMapOvr>
     <a:masterClrMapping/>
   </p:clrMapOvr>
-  <p:timing>
-    <p:tnLst>
-      <p:par>
-        <p:cTn id="1" dur="indefinite" restart="never" nodeType="tmRoot"/>
-      </p:par>
-    </p:tnLst>
-  </p:timing>
 </p:sld>
 </file>
 
@@ -4617,7 +4543,7 @@
           <p:cNvPr id="7" name="TextBox 6">
             <a:extLst>
               <a:ext uri="{FF2B5EF4-FFF2-40B4-BE49-F238E27FC236}">
-                <a16:creationId xmlns:a16="http://schemas.microsoft.com/office/drawing/2014/main" xmlns="" id="{882EAC00-0723-4478-82AE-41368060B6D4}"/>
+                <a16:creationId xmlns:a16="http://schemas.microsoft.com/office/drawing/2014/main" id="{882EAC00-0723-4478-82AE-41368060B6D4}"/>
               </a:ext>
             </a:extLst>
           </p:cNvPr>
@@ -4671,7 +4597,7 @@
           <p:cNvPr id="5" name="TextBox 4">
             <a:extLst>
               <a:ext uri="{FF2B5EF4-FFF2-40B4-BE49-F238E27FC236}">
-                <a16:creationId xmlns:a16="http://schemas.microsoft.com/office/drawing/2014/main" xmlns="" id="{2C212B8D-B3FE-4D6D-9564-0B6B9ABCF88C}"/>
+                <a16:creationId xmlns:a16="http://schemas.microsoft.com/office/drawing/2014/main" id="{2C212B8D-B3FE-4D6D-9564-0B6B9ABCF88C}"/>
               </a:ext>
             </a:extLst>
           </p:cNvPr>
@@ -4720,7 +4646,7 @@
           <p:cNvPr id="4" name="Picture 3" descr="The_Tile_Game.pdf - Adobe Acrobat Reader DC">
             <a:extLst>
               <a:ext uri="{FF2B5EF4-FFF2-40B4-BE49-F238E27FC236}">
-                <a16:creationId xmlns:a16="http://schemas.microsoft.com/office/drawing/2014/main" xmlns="" id="{CDFB2A34-60CF-4A16-88B1-EF5317DC6F8C}"/>
+                <a16:creationId xmlns:a16="http://schemas.microsoft.com/office/drawing/2014/main" id="{CDFB2A34-60CF-4A16-88B1-EF5317DC6F8C}"/>
               </a:ext>
             </a:extLst>
           </p:cNvPr>
@@ -4765,13 +4691,6 @@
   <p:clrMapOvr>
     <a:masterClrMapping/>
   </p:clrMapOvr>
-  <p:timing>
-    <p:tnLst>
-      <p:par>
-        <p:cTn id="1" dur="indefinite" restart="never" nodeType="tmRoot"/>
-      </p:par>
-    </p:tnLst>
-  </p:timing>
 </p:sld>
 </file>
 
@@ -4797,7 +4716,7 @@
           <p:cNvPr id="7" name="TextBox 6">
             <a:extLst>
               <a:ext uri="{FF2B5EF4-FFF2-40B4-BE49-F238E27FC236}">
-                <a16:creationId xmlns:a16="http://schemas.microsoft.com/office/drawing/2014/main" xmlns="" id="{882EAC00-0723-4478-82AE-41368060B6D4}"/>
+                <a16:creationId xmlns:a16="http://schemas.microsoft.com/office/drawing/2014/main" id="{882EAC00-0723-4478-82AE-41368060B6D4}"/>
               </a:ext>
             </a:extLst>
           </p:cNvPr>
@@ -4851,7 +4770,7 @@
           <p:cNvPr id="8" name="Picture 7" descr="The_Tile_Game.pdf - Adobe Acrobat Reader DC">
             <a:extLst>
               <a:ext uri="{FF2B5EF4-FFF2-40B4-BE49-F238E27FC236}">
-                <a16:creationId xmlns:a16="http://schemas.microsoft.com/office/drawing/2014/main" xmlns="" id="{C1D446B4-80CA-44B6-AE80-F4446C2874C9}"/>
+                <a16:creationId xmlns:a16="http://schemas.microsoft.com/office/drawing/2014/main" id="{C1D446B4-80CA-44B6-AE80-F4446C2874C9}"/>
               </a:ext>
             </a:extLst>
           </p:cNvPr>
@@ -4891,7 +4810,7 @@
           <p:cNvPr id="9" name="TextBox 8">
             <a:extLst>
               <a:ext uri="{FF2B5EF4-FFF2-40B4-BE49-F238E27FC236}">
-                <a16:creationId xmlns:a16="http://schemas.microsoft.com/office/drawing/2014/main" xmlns="" id="{CA2092E9-0B3F-4C3A-B4AE-27E81F293862}"/>
+                <a16:creationId xmlns:a16="http://schemas.microsoft.com/office/drawing/2014/main" id="{CA2092E9-0B3F-4C3A-B4AE-27E81F293862}"/>
               </a:ext>
             </a:extLst>
           </p:cNvPr>
@@ -4935,13 +4854,6 @@
   <p:clrMapOvr>
     <a:masterClrMapping/>
   </p:clrMapOvr>
-  <p:timing>
-    <p:tnLst>
-      <p:par>
-        <p:cTn id="1" dur="indefinite" restart="never" nodeType="tmRoot"/>
-      </p:par>
-    </p:tnLst>
-  </p:timing>
 </p:sld>
 </file>
 
@@ -4967,7 +4879,7 @@
           <p:cNvPr id="7" name="TextBox 6">
             <a:extLst>
               <a:ext uri="{FF2B5EF4-FFF2-40B4-BE49-F238E27FC236}">
-                <a16:creationId xmlns:a16="http://schemas.microsoft.com/office/drawing/2014/main" xmlns="" id="{882EAC00-0723-4478-82AE-41368060B6D4}"/>
+                <a16:creationId xmlns:a16="http://schemas.microsoft.com/office/drawing/2014/main" id="{882EAC00-0723-4478-82AE-41368060B6D4}"/>
               </a:ext>
             </a:extLst>
           </p:cNvPr>
@@ -5021,7 +4933,7 @@
           <p:cNvPr id="6" name="TextBox 5">
             <a:extLst>
               <a:ext uri="{FF2B5EF4-FFF2-40B4-BE49-F238E27FC236}">
-                <a16:creationId xmlns:a16="http://schemas.microsoft.com/office/drawing/2014/main" xmlns="" id="{EBE535B4-2F5A-4361-9659-D93E52186A33}"/>
+                <a16:creationId xmlns:a16="http://schemas.microsoft.com/office/drawing/2014/main" id="{EBE535B4-2F5A-4361-9659-D93E52186A33}"/>
               </a:ext>
             </a:extLst>
           </p:cNvPr>
@@ -5086,7 +4998,7 @@
           <p:cNvPr id="4" name="Picture 3" descr="The_Tile_Game.pdf - Adobe Acrobat Reader DC">
             <a:extLst>
               <a:ext uri="{FF2B5EF4-FFF2-40B4-BE49-F238E27FC236}">
-                <a16:creationId xmlns:a16="http://schemas.microsoft.com/office/drawing/2014/main" xmlns="" id="{DA8DDC52-ED85-468C-87E4-A8F5B3462AC5}"/>
+                <a16:creationId xmlns:a16="http://schemas.microsoft.com/office/drawing/2014/main" id="{DA8DDC52-ED85-468C-87E4-A8F5B3462AC5}"/>
               </a:ext>
             </a:extLst>
           </p:cNvPr>
@@ -5131,13 +5043,6 @@
   <p:clrMapOvr>
     <a:masterClrMapping/>
   </p:clrMapOvr>
-  <p:timing>
-    <p:tnLst>
-      <p:par>
-        <p:cTn id="1" dur="indefinite" restart="never" nodeType="tmRoot"/>
-      </p:par>
-    </p:tnLst>
-  </p:timing>
 </p:sld>
 </file>
 
@@ -5163,7 +5068,7 @@
           <p:cNvPr id="7" name="TextBox 6">
             <a:extLst>
               <a:ext uri="{FF2B5EF4-FFF2-40B4-BE49-F238E27FC236}">
-                <a16:creationId xmlns:a16="http://schemas.microsoft.com/office/drawing/2014/main" xmlns="" id="{882EAC00-0723-4478-82AE-41368060B6D4}"/>
+                <a16:creationId xmlns:a16="http://schemas.microsoft.com/office/drawing/2014/main" id="{882EAC00-0723-4478-82AE-41368060B6D4}"/>
               </a:ext>
             </a:extLst>
           </p:cNvPr>
@@ -5217,7 +5122,7 @@
           <p:cNvPr id="3" name="Picture 2" descr="The_Tile_Game.pdf - Adobe Acrobat Reader DC">
             <a:extLst>
               <a:ext uri="{FF2B5EF4-FFF2-40B4-BE49-F238E27FC236}">
-                <a16:creationId xmlns:a16="http://schemas.microsoft.com/office/drawing/2014/main" xmlns="" id="{546D0A79-5523-49F5-A2CA-B4D6AC9944A5}"/>
+                <a16:creationId xmlns:a16="http://schemas.microsoft.com/office/drawing/2014/main" id="{546D0A79-5523-49F5-A2CA-B4D6AC9944A5}"/>
               </a:ext>
             </a:extLst>
           </p:cNvPr>
@@ -5257,7 +5162,7 @@
           <p:cNvPr id="8" name="TextBox 7">
             <a:extLst>
               <a:ext uri="{FF2B5EF4-FFF2-40B4-BE49-F238E27FC236}">
-                <a16:creationId xmlns:a16="http://schemas.microsoft.com/office/drawing/2014/main" xmlns="" id="{D54BECD9-603D-4E4C-82B9-5CFB69FF720F}"/>
+                <a16:creationId xmlns:a16="http://schemas.microsoft.com/office/drawing/2014/main" id="{D54BECD9-603D-4E4C-82B9-5CFB69FF720F}"/>
               </a:ext>
             </a:extLst>
           </p:cNvPr>
@@ -5297,13 +5202,6 @@
   <p:clrMapOvr>
     <a:masterClrMapping/>
   </p:clrMapOvr>
-  <p:timing>
-    <p:tnLst>
-      <p:par>
-        <p:cTn id="1" dur="indefinite" restart="never" nodeType="tmRoot"/>
-      </p:par>
-    </p:tnLst>
-  </p:timing>
 </p:sld>
 </file>
 
@@ -5329,7 +5227,7 @@
           <p:cNvPr id="4" name="TextBox 3">
             <a:extLst>
               <a:ext uri="{FF2B5EF4-FFF2-40B4-BE49-F238E27FC236}">
-                <a16:creationId xmlns:a16="http://schemas.microsoft.com/office/drawing/2014/main" xmlns="" id="{8A67A37A-C488-40D7-A088-6774405888BB}"/>
+                <a16:creationId xmlns:a16="http://schemas.microsoft.com/office/drawing/2014/main" id="{8A67A37A-C488-40D7-A088-6774405888BB}"/>
               </a:ext>
             </a:extLst>
           </p:cNvPr>
@@ -5367,7 +5265,7 @@
           <p:cNvPr id="5" name="TextBox 4">
             <a:extLst>
               <a:ext uri="{FF2B5EF4-FFF2-40B4-BE49-F238E27FC236}">
-                <a16:creationId xmlns:a16="http://schemas.microsoft.com/office/drawing/2014/main" xmlns="" id="{EC931DCA-4690-4B93-9419-BA902293A61A}"/>
+                <a16:creationId xmlns:a16="http://schemas.microsoft.com/office/drawing/2014/main" id="{EC931DCA-4690-4B93-9419-BA902293A61A}"/>
               </a:ext>
             </a:extLst>
           </p:cNvPr>
@@ -5528,13 +5426,6 @@
   <p:clrMapOvr>
     <a:masterClrMapping/>
   </p:clrMapOvr>
-  <p:timing>
-    <p:tnLst>
-      <p:par>
-        <p:cTn id="1" dur="indefinite" restart="never" nodeType="tmRoot"/>
-      </p:par>
-    </p:tnLst>
-  </p:timing>
 </p:sld>
 </file>
 
@@ -5560,7 +5451,7 @@
           <p:cNvPr id="7" name="TextBox 6">
             <a:extLst>
               <a:ext uri="{FF2B5EF4-FFF2-40B4-BE49-F238E27FC236}">
-                <a16:creationId xmlns:a16="http://schemas.microsoft.com/office/drawing/2014/main" xmlns="" id="{882EAC00-0723-4478-82AE-41368060B6D4}"/>
+                <a16:creationId xmlns:a16="http://schemas.microsoft.com/office/drawing/2014/main" id="{882EAC00-0723-4478-82AE-41368060B6D4}"/>
               </a:ext>
             </a:extLst>
           </p:cNvPr>
@@ -5614,7 +5505,7 @@
           <p:cNvPr id="4" name="Picture 3" descr="The_Tile_Game.pdf - Adobe Acrobat Reader DC">
             <a:extLst>
               <a:ext uri="{FF2B5EF4-FFF2-40B4-BE49-F238E27FC236}">
-                <a16:creationId xmlns:a16="http://schemas.microsoft.com/office/drawing/2014/main" xmlns="" id="{4FCDD319-DB14-430E-AA52-AAB4BAED8B54}"/>
+                <a16:creationId xmlns:a16="http://schemas.microsoft.com/office/drawing/2014/main" id="{4FCDD319-DB14-430E-AA52-AAB4BAED8B54}"/>
               </a:ext>
             </a:extLst>
           </p:cNvPr>
@@ -5659,13 +5550,6 @@
   <p:clrMapOvr>
     <a:masterClrMapping/>
   </p:clrMapOvr>
-  <p:timing>
-    <p:tnLst>
-      <p:par>
-        <p:cTn id="1" dur="indefinite" restart="never" nodeType="tmRoot"/>
-      </p:par>
-    </p:tnLst>
-  </p:timing>
 </p:sld>
 </file>
 
@@ -5691,7 +5575,7 @@
           <p:cNvPr id="7" name="TextBox 6">
             <a:extLst>
               <a:ext uri="{FF2B5EF4-FFF2-40B4-BE49-F238E27FC236}">
-                <a16:creationId xmlns:a16="http://schemas.microsoft.com/office/drawing/2014/main" xmlns="" id="{882EAC00-0723-4478-82AE-41368060B6D4}"/>
+                <a16:creationId xmlns:a16="http://schemas.microsoft.com/office/drawing/2014/main" id="{882EAC00-0723-4478-82AE-41368060B6D4}"/>
               </a:ext>
             </a:extLst>
           </p:cNvPr>
@@ -5729,7 +5613,7 @@
           <p:cNvPr id="5" name="TextBox 4">
             <a:extLst>
               <a:ext uri="{FF2B5EF4-FFF2-40B4-BE49-F238E27FC236}">
-                <a16:creationId xmlns:a16="http://schemas.microsoft.com/office/drawing/2014/main" xmlns="" id="{094D4860-AD51-4681-B295-EA05BCEBB2ED}"/>
+                <a16:creationId xmlns:a16="http://schemas.microsoft.com/office/drawing/2014/main" id="{094D4860-AD51-4681-B295-EA05BCEBB2ED}"/>
               </a:ext>
             </a:extLst>
           </p:cNvPr>
@@ -5851,7 +5735,7 @@
           <p:cNvPr id="3" name="Picture 2" descr="The_Tile_Game.pdf - Adobe Acrobat Reader DC">
             <a:extLst>
               <a:ext uri="{FF2B5EF4-FFF2-40B4-BE49-F238E27FC236}">
-                <a16:creationId xmlns:a16="http://schemas.microsoft.com/office/drawing/2014/main" xmlns="" id="{3C1690F0-DFE6-4C40-A3B3-486B65D08E82}"/>
+                <a16:creationId xmlns:a16="http://schemas.microsoft.com/office/drawing/2014/main" id="{3C1690F0-DFE6-4C40-A3B3-486B65D08E82}"/>
               </a:ext>
             </a:extLst>
           </p:cNvPr>
@@ -5896,13 +5780,6 @@
   <p:clrMapOvr>
     <a:masterClrMapping/>
   </p:clrMapOvr>
-  <p:timing>
-    <p:tnLst>
-      <p:par>
-        <p:cTn id="1" dur="indefinite" restart="never" nodeType="tmRoot"/>
-      </p:par>
-    </p:tnLst>
-  </p:timing>
 </p:sld>
 </file>
 
@@ -5928,7 +5805,7 @@
           <p:cNvPr id="4" name="TextBox 3">
             <a:extLst>
               <a:ext uri="{FF2B5EF4-FFF2-40B4-BE49-F238E27FC236}">
-                <a16:creationId xmlns:a16="http://schemas.microsoft.com/office/drawing/2014/main" xmlns="" id="{8A67A37A-C488-40D7-A088-6774405888BB}"/>
+                <a16:creationId xmlns:a16="http://schemas.microsoft.com/office/drawing/2014/main" id="{8A67A37A-C488-40D7-A088-6774405888BB}"/>
               </a:ext>
             </a:extLst>
           </p:cNvPr>
@@ -5966,7 +5843,7 @@
           <p:cNvPr id="5" name="Rectangle 1">
             <a:extLst>
               <a:ext uri="{FF2B5EF4-FFF2-40B4-BE49-F238E27FC236}">
-                <a16:creationId xmlns:a16="http://schemas.microsoft.com/office/drawing/2014/main" xmlns="" id="{E51EE319-5F52-4221-9BD6-52740D2580D7}"/>
+                <a16:creationId xmlns:a16="http://schemas.microsoft.com/office/drawing/2014/main" id="{E51EE319-5F52-4221-9BD6-52740D2580D7}"/>
               </a:ext>
             </a:extLst>
           </p:cNvPr>
@@ -6035,7 +5912,7 @@
           <p:cNvPr id="6" name="Rectangle 5">
             <a:extLst>
               <a:ext uri="{FF2B5EF4-FFF2-40B4-BE49-F238E27FC236}">
-                <a16:creationId xmlns:a16="http://schemas.microsoft.com/office/drawing/2014/main" xmlns="" id="{502DB2D3-B162-4290-B093-D0C812309FC3}"/>
+                <a16:creationId xmlns:a16="http://schemas.microsoft.com/office/drawing/2014/main" id="{502DB2D3-B162-4290-B093-D0C812309FC3}"/>
               </a:ext>
             </a:extLst>
           </p:cNvPr>
@@ -6075,7 +5952,7 @@
           <p:cNvPr id="7" name="Rectangle 6">
             <a:extLst>
               <a:ext uri="{FF2B5EF4-FFF2-40B4-BE49-F238E27FC236}">
-                <a16:creationId xmlns:a16="http://schemas.microsoft.com/office/drawing/2014/main" xmlns="" id="{07E9A15F-2006-46CD-8EA4-7B3107F66E1C}"/>
+                <a16:creationId xmlns:a16="http://schemas.microsoft.com/office/drawing/2014/main" id="{07E9A15F-2006-46CD-8EA4-7B3107F66E1C}"/>
               </a:ext>
             </a:extLst>
           </p:cNvPr>
@@ -6293,13 +6170,6 @@
   <p:clrMapOvr>
     <a:masterClrMapping/>
   </p:clrMapOvr>
-  <p:timing>
-    <p:tnLst>
-      <p:par>
-        <p:cTn id="1" dur="indefinite" restart="never" nodeType="tmRoot"/>
-      </p:par>
-    </p:tnLst>
-  </p:timing>
 </p:sld>
 </file>
 
@@ -6325,7 +6195,7 @@
           <p:cNvPr id="4" name="TextBox 3">
             <a:extLst>
               <a:ext uri="{FF2B5EF4-FFF2-40B4-BE49-F238E27FC236}">
-                <a16:creationId xmlns:a16="http://schemas.microsoft.com/office/drawing/2014/main" xmlns="" id="{8A67A37A-C488-40D7-A088-6774405888BB}"/>
+                <a16:creationId xmlns:a16="http://schemas.microsoft.com/office/drawing/2014/main" id="{8A67A37A-C488-40D7-A088-6774405888BB}"/>
               </a:ext>
             </a:extLst>
           </p:cNvPr>
@@ -6363,7 +6233,7 @@
           <p:cNvPr id="5" name="Rectangle 1">
             <a:extLst>
               <a:ext uri="{FF2B5EF4-FFF2-40B4-BE49-F238E27FC236}">
-                <a16:creationId xmlns:a16="http://schemas.microsoft.com/office/drawing/2014/main" xmlns="" id="{E51EE319-5F52-4221-9BD6-52740D2580D7}"/>
+                <a16:creationId xmlns:a16="http://schemas.microsoft.com/office/drawing/2014/main" id="{E51EE319-5F52-4221-9BD6-52740D2580D7}"/>
               </a:ext>
             </a:extLst>
           </p:cNvPr>
@@ -6432,7 +6302,7 @@
           <p:cNvPr id="6" name="Rectangle 5">
             <a:extLst>
               <a:ext uri="{FF2B5EF4-FFF2-40B4-BE49-F238E27FC236}">
-                <a16:creationId xmlns:a16="http://schemas.microsoft.com/office/drawing/2014/main" xmlns="" id="{502DB2D3-B162-4290-B093-D0C812309FC3}"/>
+                <a16:creationId xmlns:a16="http://schemas.microsoft.com/office/drawing/2014/main" id="{502DB2D3-B162-4290-B093-D0C812309FC3}"/>
               </a:ext>
             </a:extLst>
           </p:cNvPr>
@@ -6472,7 +6342,7 @@
           <p:cNvPr id="9" name="Rectangle 2">
             <a:extLst>
               <a:ext uri="{FF2B5EF4-FFF2-40B4-BE49-F238E27FC236}">
-                <a16:creationId xmlns:a16="http://schemas.microsoft.com/office/drawing/2014/main" xmlns="" id="{97C1BB62-F76A-44D4-AF78-D16C19C3EB65}"/>
+                <a16:creationId xmlns:a16="http://schemas.microsoft.com/office/drawing/2014/main" id="{97C1BB62-F76A-44D4-AF78-D16C19C3EB65}"/>
               </a:ext>
             </a:extLst>
           </p:cNvPr>
@@ -6541,7 +6411,7 @@
           <p:cNvPr id="10" name="Rectangle 9">
             <a:extLst>
               <a:ext uri="{FF2B5EF4-FFF2-40B4-BE49-F238E27FC236}">
-                <a16:creationId xmlns:a16="http://schemas.microsoft.com/office/drawing/2014/main" xmlns="" id="{2240D99A-3DB9-4B55-B867-D90A8C65326A}"/>
+                <a16:creationId xmlns:a16="http://schemas.microsoft.com/office/drawing/2014/main" id="{2240D99A-3DB9-4B55-B867-D90A8C65326A}"/>
               </a:ext>
             </a:extLst>
           </p:cNvPr>
@@ -6631,13 +6501,6 @@
   <p:clrMapOvr>
     <a:masterClrMapping/>
   </p:clrMapOvr>
-  <p:timing>
-    <p:tnLst>
-      <p:par>
-        <p:cTn id="1" dur="indefinite" restart="never" nodeType="tmRoot"/>
-      </p:par>
-    </p:tnLst>
-  </p:timing>
 </p:sld>
 </file>
 
@@ -6663,7 +6526,7 @@
           <p:cNvPr id="7" name="TextBox 6">
             <a:extLst>
               <a:ext uri="{FF2B5EF4-FFF2-40B4-BE49-F238E27FC236}">
-                <a16:creationId xmlns:a16="http://schemas.microsoft.com/office/drawing/2014/main" xmlns="" id="{882EAC00-0723-4478-82AE-41368060B6D4}"/>
+                <a16:creationId xmlns:a16="http://schemas.microsoft.com/office/drawing/2014/main" id="{882EAC00-0723-4478-82AE-41368060B6D4}"/>
               </a:ext>
             </a:extLst>
           </p:cNvPr>
@@ -6701,7 +6564,7 @@
           <p:cNvPr id="8" name="TextBox 7">
             <a:extLst>
               <a:ext uri="{FF2B5EF4-FFF2-40B4-BE49-F238E27FC236}">
-                <a16:creationId xmlns:a16="http://schemas.microsoft.com/office/drawing/2014/main" xmlns="" id="{DB8E92E0-28F9-43D0-80C5-A9B98B82EE36}"/>
+                <a16:creationId xmlns:a16="http://schemas.microsoft.com/office/drawing/2014/main" id="{DB8E92E0-28F9-43D0-80C5-A9B98B82EE36}"/>
               </a:ext>
             </a:extLst>
           </p:cNvPr>
@@ -6778,7 +6641,7 @@
           <p:cNvPr id="4" name="TextBox 3">
             <a:extLst>
               <a:ext uri="{FF2B5EF4-FFF2-40B4-BE49-F238E27FC236}">
-                <a16:creationId xmlns:a16="http://schemas.microsoft.com/office/drawing/2014/main" xmlns="" id="{DB8E92E0-28F9-43D0-80C5-A9B98B82EE36}"/>
+                <a16:creationId xmlns:a16="http://schemas.microsoft.com/office/drawing/2014/main" id="{DB8E92E0-28F9-43D0-80C5-A9B98B82EE36}"/>
               </a:ext>
             </a:extLst>
           </p:cNvPr>
@@ -6801,7 +6664,7 @@
           <a:lstStyle/>
           <a:p>
             <a:r>
-              <a:rPr lang="en-US" dirty="0" smtClean="0">
+              <a:rPr lang="en-US" dirty="0">
                 <a:solidFill>
                   <a:srgbClr val="002060"/>
                 </a:solidFill>
@@ -6815,7 +6678,7 @@
               <a:buChar char="•"/>
             </a:pPr>
             <a:r>
-              <a:rPr lang="en-US" dirty="0" smtClean="0"/>
+              <a:rPr lang="en-US" dirty="0"/>
               <a:t>This is always wrong, even if sometimes it might happen to give you the correct answer. </a:t>
             </a:r>
           </a:p>
@@ -6825,7 +6688,7 @@
               <a:buChar char="•"/>
             </a:pPr>
             <a:r>
-              <a:rPr lang="en-US" dirty="0" smtClean="0">
+              <a:rPr lang="en-US" dirty="0">
                 <a:solidFill>
                   <a:srgbClr val="002060"/>
                 </a:solidFill>
@@ -6836,21 +6699,12 @@
           <a:p>
             <a:pPr lvl="1"/>
             <a:r>
-              <a:rPr lang="en-US" dirty="0" smtClean="0">
+              <a:rPr lang="en-US" dirty="0">
                 <a:solidFill>
                   <a:srgbClr val="002060"/>
                 </a:solidFill>
               </a:rPr>
               <a:t>	</a:t>
-            </a:r>
-            <a:r>
-              <a:rPr lang="en-US" dirty="0" smtClean="0">
-                <a:solidFill>
-                  <a:srgbClr val="002060"/>
-                </a:solidFill>
-                <a:hlinkClick r:id="rId2"/>
-              </a:rPr>
-              <a:t>https</a:t>
             </a:r>
             <a:r>
               <a:rPr lang="en-US" dirty="0">
@@ -6859,7 +6713,7 @@
                 </a:solidFill>
                 <a:hlinkClick r:id="rId2"/>
               </a:rPr>
-              <a:t>://www.baeldung.com/java-compare-strings</a:t>
+              <a:t>https://www.baeldung.com/java-compare-strings</a:t>
             </a:r>
             <a:r>
               <a:rPr lang="en-US" dirty="0">
@@ -6867,15 +6721,7 @@
                   <a:srgbClr val="002060"/>
                 </a:solidFill>
               </a:rPr>
-              <a:t> </a:t>
-            </a:r>
-            <a:r>
-              <a:rPr lang="en-US" dirty="0" smtClean="0">
-                <a:solidFill>
-                  <a:srgbClr val="002060"/>
-                </a:solidFill>
-              </a:rPr>
-              <a:t> </a:t>
+              <a:t>  </a:t>
             </a:r>
           </a:p>
           <a:p>
@@ -6884,14 +6730,14 @@
               <a:buChar char="•"/>
             </a:pPr>
             <a:r>
-              <a:rPr lang="en-US" dirty="0" smtClean="0">
+              <a:rPr lang="en-US" dirty="0">
                 <a:solidFill>
                   <a:srgbClr val="002060"/>
                 </a:solidFill>
               </a:rPr>
               <a:t>in some cases two String variables with the same content will point to the same memory location, but not always – you should not assume this</a:t>
             </a:r>
-            <a:endParaRPr lang="en-US" dirty="0" smtClean="0">
+            <a:endParaRPr lang="en-US" dirty="0">
               <a:solidFill>
                 <a:srgbClr val="7030A0"/>
               </a:solidFill>
@@ -6903,18 +6749,17 @@
               <a:buChar char="•"/>
             </a:pPr>
             <a:r>
-              <a:rPr lang="en-US" dirty="0" smtClean="0"/>
+              <a:rPr lang="en-US" dirty="0"/>
               <a:t>String methods that you can use instead: .equals(), .</a:t>
             </a:r>
             <a:r>
-              <a:rPr lang="en-US" dirty="0" err="1" smtClean="0"/>
+              <a:rPr lang="en-US" dirty="0" err="1"/>
               <a:t>equalsIgnoreCase</a:t>
             </a:r>
             <a:r>
-              <a:rPr lang="en-US" dirty="0" smtClean="0"/>
+              <a:rPr lang="en-US" dirty="0"/>
               <a:t>(), etc.</a:t>
             </a:r>
-            <a:endParaRPr lang="en-US" dirty="0"/>
           </a:p>
         </p:txBody>
       </p:sp>
@@ -6928,13 +6773,6 @@
   <p:clrMapOvr>
     <a:masterClrMapping/>
   </p:clrMapOvr>
-  <p:timing>
-    <p:tnLst>
-      <p:par>
-        <p:cTn id="1" dur="indefinite" restart="never" nodeType="tmRoot"/>
-      </p:par>
-    </p:tnLst>
-  </p:timing>
 </p:sld>
 </file>
 
@@ -6960,7 +6798,7 @@
           <p:cNvPr id="7" name="TextBox 6">
             <a:extLst>
               <a:ext uri="{FF2B5EF4-FFF2-40B4-BE49-F238E27FC236}">
-                <a16:creationId xmlns:a16="http://schemas.microsoft.com/office/drawing/2014/main" xmlns="" id="{882EAC00-0723-4478-82AE-41368060B6D4}"/>
+                <a16:creationId xmlns:a16="http://schemas.microsoft.com/office/drawing/2014/main" id="{882EAC00-0723-4478-82AE-41368060B6D4}"/>
               </a:ext>
             </a:extLst>
           </p:cNvPr>
@@ -6998,7 +6836,7 @@
           <p:cNvPr id="8" name="TextBox 7">
             <a:extLst>
               <a:ext uri="{FF2B5EF4-FFF2-40B4-BE49-F238E27FC236}">
-                <a16:creationId xmlns:a16="http://schemas.microsoft.com/office/drawing/2014/main" xmlns="" id="{DB8E92E0-28F9-43D0-80C5-A9B98B82EE36}"/>
+                <a16:creationId xmlns:a16="http://schemas.microsoft.com/office/drawing/2014/main" id="{DB8E92E0-28F9-43D0-80C5-A9B98B82EE36}"/>
               </a:ext>
             </a:extLst>
           </p:cNvPr>
@@ -7123,13 +6961,6 @@
   <p:clrMapOvr>
     <a:masterClrMapping/>
   </p:clrMapOvr>
-  <p:timing>
-    <p:tnLst>
-      <p:par>
-        <p:cTn id="1" dur="indefinite" restart="never" nodeType="tmRoot"/>
-      </p:par>
-    </p:tnLst>
-  </p:timing>
 </p:sld>
 </file>
 
@@ -7155,7 +6986,7 @@
           <p:cNvPr id="7" name="TextBox 6">
             <a:extLst>
               <a:ext uri="{FF2B5EF4-FFF2-40B4-BE49-F238E27FC236}">
-                <a16:creationId xmlns:a16="http://schemas.microsoft.com/office/drawing/2014/main" xmlns="" id="{882EAC00-0723-4478-82AE-41368060B6D4}"/>
+                <a16:creationId xmlns:a16="http://schemas.microsoft.com/office/drawing/2014/main" id="{882EAC00-0723-4478-82AE-41368060B6D4}"/>
               </a:ext>
             </a:extLst>
           </p:cNvPr>
@@ -7193,7 +7024,7 @@
           <p:cNvPr id="8" name="TextBox 7">
             <a:extLst>
               <a:ext uri="{FF2B5EF4-FFF2-40B4-BE49-F238E27FC236}">
-                <a16:creationId xmlns:a16="http://schemas.microsoft.com/office/drawing/2014/main" xmlns="" id="{DB8E92E0-28F9-43D0-80C5-A9B98B82EE36}"/>
+                <a16:creationId xmlns:a16="http://schemas.microsoft.com/office/drawing/2014/main" id="{DB8E92E0-28F9-43D0-80C5-A9B98B82EE36}"/>
               </a:ext>
             </a:extLst>
           </p:cNvPr>
@@ -7340,13 +7171,6 @@
   <p:clrMapOvr>
     <a:masterClrMapping/>
   </p:clrMapOvr>
-  <p:timing>
-    <p:tnLst>
-      <p:par>
-        <p:cTn id="1" dur="indefinite" restart="never" nodeType="tmRoot"/>
-      </p:par>
-    </p:tnLst>
-  </p:timing>
 </p:sld>
 </file>
 
@@ -7372,7 +7196,7 @@
           <p:cNvPr id="7" name="TextBox 6">
             <a:extLst>
               <a:ext uri="{FF2B5EF4-FFF2-40B4-BE49-F238E27FC236}">
-                <a16:creationId xmlns:a16="http://schemas.microsoft.com/office/drawing/2014/main" xmlns="" id="{882EAC00-0723-4478-82AE-41368060B6D4}"/>
+                <a16:creationId xmlns:a16="http://schemas.microsoft.com/office/drawing/2014/main" id="{882EAC00-0723-4478-82AE-41368060B6D4}"/>
               </a:ext>
             </a:extLst>
           </p:cNvPr>
@@ -7410,7 +7234,7 @@
           <p:cNvPr id="3" name="Picture 2" descr="The_Tile_Game.pdf - Adobe Acrobat Reader DC">
             <a:extLst>
               <a:ext uri="{FF2B5EF4-FFF2-40B4-BE49-F238E27FC236}">
-                <a16:creationId xmlns:a16="http://schemas.microsoft.com/office/drawing/2014/main" xmlns="" id="{5F395B11-0174-4728-B7C3-4EF29B738814}"/>
+                <a16:creationId xmlns:a16="http://schemas.microsoft.com/office/drawing/2014/main" id="{5F395B11-0174-4728-B7C3-4EF29B738814}"/>
               </a:ext>
             </a:extLst>
           </p:cNvPr>
@@ -7450,7 +7274,7 @@
           <p:cNvPr id="4" name="TextBox 3">
             <a:extLst>
               <a:ext uri="{FF2B5EF4-FFF2-40B4-BE49-F238E27FC236}">
-                <a16:creationId xmlns:a16="http://schemas.microsoft.com/office/drawing/2014/main" xmlns="" id="{999888BB-AEF6-4586-B106-50A0036A675D}"/>
+                <a16:creationId xmlns:a16="http://schemas.microsoft.com/office/drawing/2014/main" id="{999888BB-AEF6-4586-B106-50A0036A675D}"/>
               </a:ext>
             </a:extLst>
           </p:cNvPr>
@@ -7485,7 +7309,7 @@
           <p:cNvPr id="12" name="Picture 11" descr="15 Puzzle: A sliding tile game - Thonky.com - Mozilla Firefox">
             <a:extLst>
               <a:ext uri="{FF2B5EF4-FFF2-40B4-BE49-F238E27FC236}">
-                <a16:creationId xmlns:a16="http://schemas.microsoft.com/office/drawing/2014/main" xmlns="" id="{28D3D2E7-8A04-454E-8A7A-2FA97F116D63}"/>
+                <a16:creationId xmlns:a16="http://schemas.microsoft.com/office/drawing/2014/main" id="{28D3D2E7-8A04-454E-8A7A-2FA97F116D63}"/>
               </a:ext>
             </a:extLst>
           </p:cNvPr>
@@ -7520,7 +7344,7 @@
           <p:cNvPr id="13" name="TextBox 12">
             <a:extLst>
               <a:ext uri="{FF2B5EF4-FFF2-40B4-BE49-F238E27FC236}">
-                <a16:creationId xmlns:a16="http://schemas.microsoft.com/office/drawing/2014/main" xmlns="" id="{86BC7574-DA6A-4B8C-B1F2-AE801FF9AD20}"/>
+                <a16:creationId xmlns:a16="http://schemas.microsoft.com/office/drawing/2014/main" id="{86BC7574-DA6A-4B8C-B1F2-AE801FF9AD20}"/>
               </a:ext>
             </a:extLst>
           </p:cNvPr>
@@ -7555,7 +7379,7 @@
           <p:cNvPr id="15" name="Picture 14" descr="C:\Users\Karin\Google Drive\CS\CS401PF\sample_output_tile_game.txt - Notepad++">
             <a:extLst>
               <a:ext uri="{FF2B5EF4-FFF2-40B4-BE49-F238E27FC236}">
-                <a16:creationId xmlns:a16="http://schemas.microsoft.com/office/drawing/2014/main" xmlns="" id="{6EADA397-DB46-4A20-81DD-9C26CC37DEC2}"/>
+                <a16:creationId xmlns:a16="http://schemas.microsoft.com/office/drawing/2014/main" id="{6EADA397-DB46-4A20-81DD-9C26CC37DEC2}"/>
               </a:ext>
             </a:extLst>
           </p:cNvPr>
@@ -7595,13 +7419,6 @@
   <p:clrMapOvr>
     <a:masterClrMapping/>
   </p:clrMapOvr>
-  <p:timing>
-    <p:tnLst>
-      <p:par>
-        <p:cTn id="1" dur="indefinite" restart="never" nodeType="tmRoot"/>
-      </p:par>
-    </p:tnLst>
-  </p:timing>
 </p:sld>
 </file>
 
@@ -7627,7 +7444,7 @@
           <p:cNvPr id="7" name="TextBox 6">
             <a:extLst>
               <a:ext uri="{FF2B5EF4-FFF2-40B4-BE49-F238E27FC236}">
-                <a16:creationId xmlns:a16="http://schemas.microsoft.com/office/drawing/2014/main" xmlns="" id="{882EAC00-0723-4478-82AE-41368060B6D4}"/>
+                <a16:creationId xmlns:a16="http://schemas.microsoft.com/office/drawing/2014/main" id="{882EAC00-0723-4478-82AE-41368060B6D4}"/>
               </a:ext>
             </a:extLst>
           </p:cNvPr>
@@ -7665,7 +7482,7 @@
           <p:cNvPr id="4" name="TextBox 3">
             <a:extLst>
               <a:ext uri="{FF2B5EF4-FFF2-40B4-BE49-F238E27FC236}">
-                <a16:creationId xmlns:a16="http://schemas.microsoft.com/office/drawing/2014/main" xmlns="" id="{E3C27F4F-95B1-4A6D-9E5C-E5985EB86477}"/>
+                <a16:creationId xmlns:a16="http://schemas.microsoft.com/office/drawing/2014/main" id="{E3C27F4F-95B1-4A6D-9E5C-E5985EB86477}"/>
               </a:ext>
             </a:extLst>
           </p:cNvPr>
@@ -7746,13 +7563,6 @@
   <p:clrMapOvr>
     <a:masterClrMapping/>
   </p:clrMapOvr>
-  <p:timing>
-    <p:tnLst>
-      <p:par>
-        <p:cTn id="1" dur="indefinite" restart="never" nodeType="tmRoot"/>
-      </p:par>
-    </p:tnLst>
-  </p:timing>
 </p:sld>
 </file>
 

</xml_diff>